<commit_message>
Formatting & content edits
</commit_message>
<xml_diff>
--- a/docs/Presentation.pptx
+++ b/docs/Presentation.pptx
@@ -5,7 +5,7 @@
     <p:sldMasterId id="2147483660" r:id="rId1"/>
   </p:sldMasterIdLst>
   <p:notesMasterIdLst>
-    <p:notesMasterId r:id="rId18"/>
+    <p:notesMasterId r:id="rId21"/>
   </p:notesMasterIdLst>
   <p:sldIdLst>
     <p:sldId id="256" r:id="rId2"/>
@@ -16,14 +16,17 @@
     <p:sldId id="263" r:id="rId7"/>
     <p:sldId id="260" r:id="rId8"/>
     <p:sldId id="266" r:id="rId9"/>
-    <p:sldId id="269" r:id="rId10"/>
-    <p:sldId id="271" r:id="rId11"/>
-    <p:sldId id="270" r:id="rId12"/>
-    <p:sldId id="261" r:id="rId13"/>
-    <p:sldId id="265" r:id="rId14"/>
-    <p:sldId id="264" r:id="rId15"/>
-    <p:sldId id="267" r:id="rId16"/>
-    <p:sldId id="268" r:id="rId17"/>
+    <p:sldId id="274" r:id="rId10"/>
+    <p:sldId id="269" r:id="rId11"/>
+    <p:sldId id="271" r:id="rId12"/>
+    <p:sldId id="272" r:id="rId13"/>
+    <p:sldId id="270" r:id="rId14"/>
+    <p:sldId id="261" r:id="rId15"/>
+    <p:sldId id="265" r:id="rId16"/>
+    <p:sldId id="264" r:id="rId17"/>
+    <p:sldId id="273" r:id="rId18"/>
+    <p:sldId id="267" r:id="rId19"/>
+    <p:sldId id="268" r:id="rId20"/>
   </p:sldIdLst>
   <p:sldSz cx="12192000" cy="6858000"/>
   <p:notesSz cx="6858000" cy="9144000"/>
@@ -130,6 +133,482 @@
 </p:presentation>
 </file>
 
+<file path=ppt/revisionInfo.xml><?xml version="1.0" encoding="utf-8"?>
+<p1510:revInfo xmlns:a="http://schemas.openxmlformats.org/drawingml/2006/main" xmlns:r="http://schemas.openxmlformats.org/officeDocument/2006/relationships" xmlns:p1510="http://schemas.microsoft.com/office/powerpoint/2015/10/main">
+  <p1510:revLst>
+    <p1510:client id="{2E07F154-E418-48D3-B9C3-C5A2B3AD439E}" v="45" dt="2019-12-12T19:58:44.445"/>
+  </p1510:revLst>
+</p1510:revInfo>
+</file>
+
+<file path=ppt/changesInfos/changesInfo1.xml><?xml version="1.0" encoding="utf-8"?>
+<pc:chgInfo xmlns:a="http://schemas.openxmlformats.org/drawingml/2006/main" xmlns:r="http://schemas.openxmlformats.org/officeDocument/2006/relationships" xmlns:ac="http://schemas.microsoft.com/office/drawing/2013/main/command" xmlns:pc="http://schemas.microsoft.com/office/powerpoint/2013/main/command">
+  <pc:docChgLst>
+    <pc:chgData name="Frederick, Kendra" userId="46b225b0-66c1-4c45-b146-80e8e800b3c0" providerId="ADAL" clId="{2E07F154-E418-48D3-B9C3-C5A2B3AD439E}"/>
+    <pc:docChg chg="undo custSel addSld modSld sldOrd">
+      <pc:chgData name="Frederick, Kendra" userId="46b225b0-66c1-4c45-b146-80e8e800b3c0" providerId="ADAL" clId="{2E07F154-E418-48D3-B9C3-C5A2B3AD439E}" dt="2019-12-12T19:58:44.444" v="578"/>
+      <pc:docMkLst>
+        <pc:docMk/>
+      </pc:docMkLst>
+      <pc:sldChg chg="modSp">
+        <pc:chgData name="Frederick, Kendra" userId="46b225b0-66c1-4c45-b146-80e8e800b3c0" providerId="ADAL" clId="{2E07F154-E418-48D3-B9C3-C5A2B3AD439E}" dt="2019-12-12T19:10:26.007" v="4" actId="14100"/>
+        <pc:sldMkLst>
+          <pc:docMk/>
+          <pc:sldMk cId="677750090" sldId="257"/>
+        </pc:sldMkLst>
+        <pc:spChg chg="mod">
+          <ac:chgData name="Frederick, Kendra" userId="46b225b0-66c1-4c45-b146-80e8e800b3c0" providerId="ADAL" clId="{2E07F154-E418-48D3-B9C3-C5A2B3AD439E}" dt="2019-12-12T19:10:26.007" v="4" actId="14100"/>
+          <ac:spMkLst>
+            <pc:docMk/>
+            <pc:sldMk cId="677750090" sldId="257"/>
+            <ac:spMk id="2" creationId="{8A8A262D-FB65-2646-8BFA-1DCAD9218EEE}"/>
+          </ac:spMkLst>
+        </pc:spChg>
+      </pc:sldChg>
+      <pc:sldChg chg="modSp">
+        <pc:chgData name="Frederick, Kendra" userId="46b225b0-66c1-4c45-b146-80e8e800b3c0" providerId="ADAL" clId="{2E07F154-E418-48D3-B9C3-C5A2B3AD439E}" dt="2019-12-12T19:11:36.549" v="13" actId="1076"/>
+        <pc:sldMkLst>
+          <pc:docMk/>
+          <pc:sldMk cId="1554287694" sldId="258"/>
+        </pc:sldMkLst>
+        <pc:spChg chg="mod">
+          <ac:chgData name="Frederick, Kendra" userId="46b225b0-66c1-4c45-b146-80e8e800b3c0" providerId="ADAL" clId="{2E07F154-E418-48D3-B9C3-C5A2B3AD439E}" dt="2019-12-12T19:11:31.854" v="12" actId="1076"/>
+          <ac:spMkLst>
+            <pc:docMk/>
+            <pc:sldMk cId="1554287694" sldId="258"/>
+            <ac:spMk id="2" creationId="{090FC1E9-5F20-2340-BA0C-2EECDF6F2206}"/>
+          </ac:spMkLst>
+        </pc:spChg>
+        <pc:spChg chg="mod">
+          <ac:chgData name="Frederick, Kendra" userId="46b225b0-66c1-4c45-b146-80e8e800b3c0" providerId="ADAL" clId="{2E07F154-E418-48D3-B9C3-C5A2B3AD439E}" dt="2019-12-12T19:11:36.549" v="13" actId="1076"/>
+          <ac:spMkLst>
+            <pc:docMk/>
+            <pc:sldMk cId="1554287694" sldId="258"/>
+            <ac:spMk id="3" creationId="{B4F9E1E4-8EF3-BC41-8968-F388CF124429}"/>
+          </ac:spMkLst>
+        </pc:spChg>
+      </pc:sldChg>
+      <pc:sldChg chg="modSp">
+        <pc:chgData name="Frederick, Kendra" userId="46b225b0-66c1-4c45-b146-80e8e800b3c0" providerId="ADAL" clId="{2E07F154-E418-48D3-B9C3-C5A2B3AD439E}" dt="2019-12-12T19:16:40.584" v="175" actId="20577"/>
+        <pc:sldMkLst>
+          <pc:docMk/>
+          <pc:sldMk cId="3864775188" sldId="259"/>
+        </pc:sldMkLst>
+        <pc:spChg chg="mod">
+          <ac:chgData name="Frederick, Kendra" userId="46b225b0-66c1-4c45-b146-80e8e800b3c0" providerId="ADAL" clId="{2E07F154-E418-48D3-B9C3-C5A2B3AD439E}" dt="2019-12-12T19:11:48.160" v="19" actId="1076"/>
+          <ac:spMkLst>
+            <pc:docMk/>
+            <pc:sldMk cId="3864775188" sldId="259"/>
+            <ac:spMk id="2" creationId="{62C91579-61BF-674D-99B4-168197967E9C}"/>
+          </ac:spMkLst>
+        </pc:spChg>
+        <pc:spChg chg="mod">
+          <ac:chgData name="Frederick, Kendra" userId="46b225b0-66c1-4c45-b146-80e8e800b3c0" providerId="ADAL" clId="{2E07F154-E418-48D3-B9C3-C5A2B3AD439E}" dt="2019-12-12T19:16:40.584" v="175" actId="20577"/>
+          <ac:spMkLst>
+            <pc:docMk/>
+            <pc:sldMk cId="3864775188" sldId="259"/>
+            <ac:spMk id="3" creationId="{73C1D7BC-A9D1-C344-B05F-41412E4F2470}"/>
+          </ac:spMkLst>
+        </pc:spChg>
+      </pc:sldChg>
+      <pc:sldChg chg="modSp">
+        <pc:chgData name="Frederick, Kendra" userId="46b225b0-66c1-4c45-b146-80e8e800b3c0" providerId="ADAL" clId="{2E07F154-E418-48D3-B9C3-C5A2B3AD439E}" dt="2019-12-12T19:19:18.594" v="207" actId="20577"/>
+        <pc:sldMkLst>
+          <pc:docMk/>
+          <pc:sldMk cId="1479351257" sldId="260"/>
+        </pc:sldMkLst>
+        <pc:spChg chg="mod">
+          <ac:chgData name="Frederick, Kendra" userId="46b225b0-66c1-4c45-b146-80e8e800b3c0" providerId="ADAL" clId="{2E07F154-E418-48D3-B9C3-C5A2B3AD439E}" dt="2019-12-12T19:19:01.091" v="195" actId="1076"/>
+          <ac:spMkLst>
+            <pc:docMk/>
+            <pc:sldMk cId="1479351257" sldId="260"/>
+            <ac:spMk id="2" creationId="{2ECA3613-7224-2447-BB0E-F9160943A7F1}"/>
+          </ac:spMkLst>
+        </pc:spChg>
+        <pc:spChg chg="mod">
+          <ac:chgData name="Frederick, Kendra" userId="46b225b0-66c1-4c45-b146-80e8e800b3c0" providerId="ADAL" clId="{2E07F154-E418-48D3-B9C3-C5A2B3AD439E}" dt="2019-12-12T19:19:18.594" v="207" actId="20577"/>
+          <ac:spMkLst>
+            <pc:docMk/>
+            <pc:sldMk cId="1479351257" sldId="260"/>
+            <ac:spMk id="5" creationId="{8906492E-6B27-6A48-8B5C-8BC58544B5E7}"/>
+          </ac:spMkLst>
+        </pc:spChg>
+      </pc:sldChg>
+      <pc:sldChg chg="modSp">
+        <pc:chgData name="Frederick, Kendra" userId="46b225b0-66c1-4c45-b146-80e8e800b3c0" providerId="ADAL" clId="{2E07F154-E418-48D3-B9C3-C5A2B3AD439E}" dt="2019-12-12T19:49:43.517" v="409" actId="1076"/>
+        <pc:sldMkLst>
+          <pc:docMk/>
+          <pc:sldMk cId="638821798" sldId="261"/>
+        </pc:sldMkLst>
+        <pc:spChg chg="mod">
+          <ac:chgData name="Frederick, Kendra" userId="46b225b0-66c1-4c45-b146-80e8e800b3c0" providerId="ADAL" clId="{2E07F154-E418-48D3-B9C3-C5A2B3AD439E}" dt="2019-12-12T19:49:43.517" v="409" actId="1076"/>
+          <ac:spMkLst>
+            <pc:docMk/>
+            <pc:sldMk cId="638821798" sldId="261"/>
+            <ac:spMk id="7" creationId="{9F5234E5-66CA-FB40-B3E1-A7E5351E4DC5}"/>
+          </ac:spMkLst>
+        </pc:spChg>
+      </pc:sldChg>
+      <pc:sldChg chg="modSp">
+        <pc:chgData name="Frederick, Kendra" userId="46b225b0-66c1-4c45-b146-80e8e800b3c0" providerId="ADAL" clId="{2E07F154-E418-48D3-B9C3-C5A2B3AD439E}" dt="2019-12-12T19:17:47.571" v="183" actId="1076"/>
+        <pc:sldMkLst>
+          <pc:docMk/>
+          <pc:sldMk cId="3206130458" sldId="262"/>
+        </pc:sldMkLst>
+        <pc:spChg chg="mod">
+          <ac:chgData name="Frederick, Kendra" userId="46b225b0-66c1-4c45-b146-80e8e800b3c0" providerId="ADAL" clId="{2E07F154-E418-48D3-B9C3-C5A2B3AD439E}" dt="2019-12-12T19:17:47.571" v="183" actId="1076"/>
+          <ac:spMkLst>
+            <pc:docMk/>
+            <pc:sldMk cId="3206130458" sldId="262"/>
+            <ac:spMk id="2" creationId="{1327E9F2-A4A1-B740-9B58-892A40E89083}"/>
+          </ac:spMkLst>
+        </pc:spChg>
+      </pc:sldChg>
+      <pc:sldChg chg="modSp">
+        <pc:chgData name="Frederick, Kendra" userId="46b225b0-66c1-4c45-b146-80e8e800b3c0" providerId="ADAL" clId="{2E07F154-E418-48D3-B9C3-C5A2B3AD439E}" dt="2019-12-12T19:18:22.851" v="189" actId="1076"/>
+        <pc:sldMkLst>
+          <pc:docMk/>
+          <pc:sldMk cId="456505107" sldId="263"/>
+        </pc:sldMkLst>
+        <pc:spChg chg="mod">
+          <ac:chgData name="Frederick, Kendra" userId="46b225b0-66c1-4c45-b146-80e8e800b3c0" providerId="ADAL" clId="{2E07F154-E418-48D3-B9C3-C5A2B3AD439E}" dt="2019-12-12T19:18:22.851" v="189" actId="1076"/>
+          <ac:spMkLst>
+            <pc:docMk/>
+            <pc:sldMk cId="456505107" sldId="263"/>
+            <ac:spMk id="2" creationId="{6D0A3CDC-23D8-DB44-A25A-2B2EBE3ED23D}"/>
+          </ac:spMkLst>
+        </pc:spChg>
+      </pc:sldChg>
+      <pc:sldChg chg="modSp">
+        <pc:chgData name="Frederick, Kendra" userId="46b225b0-66c1-4c45-b146-80e8e800b3c0" providerId="ADAL" clId="{2E07F154-E418-48D3-B9C3-C5A2B3AD439E}" dt="2019-12-12T19:50:37.412" v="472" actId="20577"/>
+        <pc:sldMkLst>
+          <pc:docMk/>
+          <pc:sldMk cId="3225992162" sldId="264"/>
+        </pc:sldMkLst>
+        <pc:spChg chg="mod">
+          <ac:chgData name="Frederick, Kendra" userId="46b225b0-66c1-4c45-b146-80e8e800b3c0" providerId="ADAL" clId="{2E07F154-E418-48D3-B9C3-C5A2B3AD439E}" dt="2019-12-12T19:50:37.412" v="472" actId="20577"/>
+          <ac:spMkLst>
+            <pc:docMk/>
+            <pc:sldMk cId="3225992162" sldId="264"/>
+            <ac:spMk id="2" creationId="{86631A11-A0E3-B141-A734-A45BB526CC3B}"/>
+          </ac:spMkLst>
+        </pc:spChg>
+      </pc:sldChg>
+      <pc:sldChg chg="addSp modSp">
+        <pc:chgData name="Frederick, Kendra" userId="46b225b0-66c1-4c45-b146-80e8e800b3c0" providerId="ADAL" clId="{2E07F154-E418-48D3-B9C3-C5A2B3AD439E}" dt="2019-12-12T19:50:21.309" v="467" actId="20577"/>
+        <pc:sldMkLst>
+          <pc:docMk/>
+          <pc:sldMk cId="4077622182" sldId="265"/>
+        </pc:sldMkLst>
+        <pc:spChg chg="mod">
+          <ac:chgData name="Frederick, Kendra" userId="46b225b0-66c1-4c45-b146-80e8e800b3c0" providerId="ADAL" clId="{2E07F154-E418-48D3-B9C3-C5A2B3AD439E}" dt="2019-12-12T19:49:52.171" v="413" actId="1076"/>
+          <ac:spMkLst>
+            <pc:docMk/>
+            <pc:sldMk cId="4077622182" sldId="265"/>
+            <ac:spMk id="2" creationId="{8E5DDE81-5CA0-CB47-88AB-2ECA9B61D10C}"/>
+          </ac:spMkLst>
+        </pc:spChg>
+        <pc:spChg chg="add mod">
+          <ac:chgData name="Frederick, Kendra" userId="46b225b0-66c1-4c45-b146-80e8e800b3c0" providerId="ADAL" clId="{2E07F154-E418-48D3-B9C3-C5A2B3AD439E}" dt="2019-12-12T19:50:21.309" v="467" actId="20577"/>
+          <ac:spMkLst>
+            <pc:docMk/>
+            <pc:sldMk cId="4077622182" sldId="265"/>
+            <ac:spMk id="3" creationId="{36195225-15CD-4504-816D-CA34A24304A1}"/>
+          </ac:spMkLst>
+        </pc:spChg>
+        <pc:picChg chg="mod">
+          <ac:chgData name="Frederick, Kendra" userId="46b225b0-66c1-4c45-b146-80e8e800b3c0" providerId="ADAL" clId="{2E07F154-E418-48D3-B9C3-C5A2B3AD439E}" dt="2019-12-12T19:50:00.421" v="415" actId="1076"/>
+          <ac:picMkLst>
+            <pc:docMk/>
+            <pc:sldMk cId="4077622182" sldId="265"/>
+            <ac:picMk id="5" creationId="{6EEAE6CF-C760-114D-88D0-53A0A09BB4EA}"/>
+          </ac:picMkLst>
+        </pc:picChg>
+      </pc:sldChg>
+      <pc:sldChg chg="modSp">
+        <pc:chgData name="Frederick, Kendra" userId="46b225b0-66c1-4c45-b146-80e8e800b3c0" providerId="ADAL" clId="{2E07F154-E418-48D3-B9C3-C5A2B3AD439E}" dt="2019-12-12T19:19:55.223" v="227" actId="1076"/>
+        <pc:sldMkLst>
+          <pc:docMk/>
+          <pc:sldMk cId="2616934015" sldId="266"/>
+        </pc:sldMkLst>
+        <pc:spChg chg="mod">
+          <ac:chgData name="Frederick, Kendra" userId="46b225b0-66c1-4c45-b146-80e8e800b3c0" providerId="ADAL" clId="{2E07F154-E418-48D3-B9C3-C5A2B3AD439E}" dt="2019-12-12T19:19:45.290" v="225" actId="1076"/>
+          <ac:spMkLst>
+            <pc:docMk/>
+            <pc:sldMk cId="2616934015" sldId="266"/>
+            <ac:spMk id="2" creationId="{DE9EA540-011A-3742-865C-C4DAE01C2A15}"/>
+          </ac:spMkLst>
+        </pc:spChg>
+        <pc:spChg chg="mod">
+          <ac:chgData name="Frederick, Kendra" userId="46b225b0-66c1-4c45-b146-80e8e800b3c0" providerId="ADAL" clId="{2E07F154-E418-48D3-B9C3-C5A2B3AD439E}" dt="2019-12-12T19:19:55.223" v="227" actId="1076"/>
+          <ac:spMkLst>
+            <pc:docMk/>
+            <pc:sldMk cId="2616934015" sldId="266"/>
+            <ac:spMk id="5" creationId="{AFF0DF6F-BD87-434C-B476-10F74410C310}"/>
+          </ac:spMkLst>
+        </pc:spChg>
+        <pc:graphicFrameChg chg="mod">
+          <ac:chgData name="Frederick, Kendra" userId="46b225b0-66c1-4c45-b146-80e8e800b3c0" providerId="ADAL" clId="{2E07F154-E418-48D3-B9C3-C5A2B3AD439E}" dt="2019-12-12T19:19:52.959" v="226" actId="1076"/>
+          <ac:graphicFrameMkLst>
+            <pc:docMk/>
+            <pc:sldMk cId="2616934015" sldId="266"/>
+            <ac:graphicFrameMk id="4" creationId="{EF9A2478-065D-0A40-9B7C-5D644BFABE6B}"/>
+          </ac:graphicFrameMkLst>
+        </pc:graphicFrameChg>
+      </pc:sldChg>
+      <pc:sldChg chg="addSp modSp">
+        <pc:chgData name="Frederick, Kendra" userId="46b225b0-66c1-4c45-b146-80e8e800b3c0" providerId="ADAL" clId="{2E07F154-E418-48D3-B9C3-C5A2B3AD439E}" dt="2019-12-12T19:51:29.515" v="521" actId="20577"/>
+        <pc:sldMkLst>
+          <pc:docMk/>
+          <pc:sldMk cId="2974474177" sldId="267"/>
+        </pc:sldMkLst>
+        <pc:spChg chg="add mod">
+          <ac:chgData name="Frederick, Kendra" userId="46b225b0-66c1-4c45-b146-80e8e800b3c0" providerId="ADAL" clId="{2E07F154-E418-48D3-B9C3-C5A2B3AD439E}" dt="2019-12-12T19:51:29.515" v="521" actId="20577"/>
+          <ac:spMkLst>
+            <pc:docMk/>
+            <pc:sldMk cId="2974474177" sldId="267"/>
+            <ac:spMk id="3" creationId="{EEAA9D4C-D850-4EC6-A063-E40212C85C98}"/>
+          </ac:spMkLst>
+        </pc:spChg>
+      </pc:sldChg>
+      <pc:sldChg chg="addSp modSp">
+        <pc:chgData name="Frederick, Kendra" userId="46b225b0-66c1-4c45-b146-80e8e800b3c0" providerId="ADAL" clId="{2E07F154-E418-48D3-B9C3-C5A2B3AD439E}" dt="2019-12-12T19:51:45.442" v="546" actId="1076"/>
+        <pc:sldMkLst>
+          <pc:docMk/>
+          <pc:sldMk cId="1217331592" sldId="268"/>
+        </pc:sldMkLst>
+        <pc:spChg chg="add mod">
+          <ac:chgData name="Frederick, Kendra" userId="46b225b0-66c1-4c45-b146-80e8e800b3c0" providerId="ADAL" clId="{2E07F154-E418-48D3-B9C3-C5A2B3AD439E}" dt="2019-12-12T19:51:45.442" v="546" actId="1076"/>
+          <ac:spMkLst>
+            <pc:docMk/>
+            <pc:sldMk cId="1217331592" sldId="268"/>
+            <ac:spMk id="4" creationId="{027C6303-5225-4EC2-BB0B-E9A4C08CE967}"/>
+          </ac:spMkLst>
+        </pc:spChg>
+      </pc:sldChg>
+      <pc:sldChg chg="addSp modSp modAnim">
+        <pc:chgData name="Frederick, Kendra" userId="46b225b0-66c1-4c45-b146-80e8e800b3c0" providerId="ADAL" clId="{2E07F154-E418-48D3-B9C3-C5A2B3AD439E}" dt="2019-12-12T19:39:34.573" v="300" actId="1076"/>
+        <pc:sldMkLst>
+          <pc:docMk/>
+          <pc:sldMk cId="3742588891" sldId="269"/>
+        </pc:sldMkLst>
+        <pc:spChg chg="mod">
+          <ac:chgData name="Frederick, Kendra" userId="46b225b0-66c1-4c45-b146-80e8e800b3c0" providerId="ADAL" clId="{2E07F154-E418-48D3-B9C3-C5A2B3AD439E}" dt="2019-12-12T19:38:08.503" v="282" actId="14100"/>
+          <ac:spMkLst>
+            <pc:docMk/>
+            <pc:sldMk cId="3742588891" sldId="269"/>
+            <ac:spMk id="2" creationId="{20F3B432-91FC-0042-80AA-F8DA114FD276}"/>
+          </ac:spMkLst>
+        </pc:spChg>
+        <pc:spChg chg="add mod">
+          <ac:chgData name="Frederick, Kendra" userId="46b225b0-66c1-4c45-b146-80e8e800b3c0" providerId="ADAL" clId="{2E07F154-E418-48D3-B9C3-C5A2B3AD439E}" dt="2019-12-12T19:37:59.373" v="278" actId="1037"/>
+          <ac:spMkLst>
+            <pc:docMk/>
+            <pc:sldMk cId="3742588891" sldId="269"/>
+            <ac:spMk id="9" creationId="{B1E03ED9-7343-4299-949E-3787B69E188A}"/>
+          </ac:spMkLst>
+        </pc:spChg>
+        <pc:spChg chg="add mod">
+          <ac:chgData name="Frederick, Kendra" userId="46b225b0-66c1-4c45-b146-80e8e800b3c0" providerId="ADAL" clId="{2E07F154-E418-48D3-B9C3-C5A2B3AD439E}" dt="2019-12-12T19:39:34.573" v="300" actId="1076"/>
+          <ac:spMkLst>
+            <pc:docMk/>
+            <pc:sldMk cId="3742588891" sldId="269"/>
+            <ac:spMk id="14" creationId="{9D3F5DA9-3C32-4971-99A2-D697CBCEBA98}"/>
+          </ac:spMkLst>
+        </pc:spChg>
+        <pc:cxnChg chg="add mod">
+          <ac:chgData name="Frederick, Kendra" userId="46b225b0-66c1-4c45-b146-80e8e800b3c0" providerId="ADAL" clId="{2E07F154-E418-48D3-B9C3-C5A2B3AD439E}" dt="2019-12-12T19:37:51.965" v="270" actId="1038"/>
+          <ac:cxnSpMkLst>
+            <pc:docMk/>
+            <pc:sldMk cId="3742588891" sldId="269"/>
+            <ac:cxnSpMk id="8" creationId="{FFDE9F7A-E505-4DFA-ADAB-B9A87C1841F8}"/>
+          </ac:cxnSpMkLst>
+        </pc:cxnChg>
+      </pc:sldChg>
+      <pc:sldChg chg="modSp">
+        <pc:chgData name="Frederick, Kendra" userId="46b225b0-66c1-4c45-b146-80e8e800b3c0" providerId="ADAL" clId="{2E07F154-E418-48D3-B9C3-C5A2B3AD439E}" dt="2019-12-12T19:49:24.459" v="406" actId="20577"/>
+        <pc:sldMkLst>
+          <pc:docMk/>
+          <pc:sldMk cId="393610802" sldId="270"/>
+        </pc:sldMkLst>
+        <pc:spChg chg="mod">
+          <ac:chgData name="Frederick, Kendra" userId="46b225b0-66c1-4c45-b146-80e8e800b3c0" providerId="ADAL" clId="{2E07F154-E418-48D3-B9C3-C5A2B3AD439E}" dt="2019-12-12T19:49:24.459" v="406" actId="20577"/>
+          <ac:spMkLst>
+            <pc:docMk/>
+            <pc:sldMk cId="393610802" sldId="270"/>
+            <ac:spMk id="3" creationId="{43B626B8-0930-FD44-B7C4-848F2D2227B0}"/>
+          </ac:spMkLst>
+        </pc:spChg>
+        <pc:spChg chg="mod">
+          <ac:chgData name="Frederick, Kendra" userId="46b225b0-66c1-4c45-b146-80e8e800b3c0" providerId="ADAL" clId="{2E07F154-E418-48D3-B9C3-C5A2B3AD439E}" dt="2019-12-12T19:49:15.859" v="401" actId="1076"/>
+          <ac:spMkLst>
+            <pc:docMk/>
+            <pc:sldMk cId="393610802" sldId="270"/>
+            <ac:spMk id="4" creationId="{98B9FD84-B092-4641-9A99-825B6EAA275B}"/>
+          </ac:spMkLst>
+        </pc:spChg>
+      </pc:sldChg>
+      <pc:sldChg chg="addSp modSp modAnim">
+        <pc:chgData name="Frederick, Kendra" userId="46b225b0-66c1-4c45-b146-80e8e800b3c0" providerId="ADAL" clId="{2E07F154-E418-48D3-B9C3-C5A2B3AD439E}" dt="2019-12-12T19:38:57.151" v="298" actId="207"/>
+        <pc:sldMkLst>
+          <pc:docMk/>
+          <pc:sldMk cId="1341364427" sldId="271"/>
+        </pc:sldMkLst>
+        <pc:spChg chg="mod">
+          <ac:chgData name="Frederick, Kendra" userId="46b225b0-66c1-4c45-b146-80e8e800b3c0" providerId="ADAL" clId="{2E07F154-E418-48D3-B9C3-C5A2B3AD439E}" dt="2019-12-12T19:38:18.809" v="285" actId="14100"/>
+          <ac:spMkLst>
+            <pc:docMk/>
+            <pc:sldMk cId="1341364427" sldId="271"/>
+            <ac:spMk id="2" creationId="{8474903E-F545-4345-A2FB-BE02E9312EBB}"/>
+          </ac:spMkLst>
+        </pc:spChg>
+        <pc:spChg chg="add mod">
+          <ac:chgData name="Frederick, Kendra" userId="46b225b0-66c1-4c45-b146-80e8e800b3c0" providerId="ADAL" clId="{2E07F154-E418-48D3-B9C3-C5A2B3AD439E}" dt="2019-12-12T19:38:57.151" v="298" actId="207"/>
+          <ac:spMkLst>
+            <pc:docMk/>
+            <pc:sldMk cId="1341364427" sldId="271"/>
+            <ac:spMk id="12" creationId="{7526FCEF-F772-4807-80FD-3E9E5A79CF46}"/>
+          </ac:spMkLst>
+        </pc:spChg>
+      </pc:sldChg>
+      <pc:sldChg chg="addSp delSp modSp add modNotesTx">
+        <pc:chgData name="Frederick, Kendra" userId="46b225b0-66c1-4c45-b146-80e8e800b3c0" providerId="ADAL" clId="{2E07F154-E418-48D3-B9C3-C5A2B3AD439E}" dt="2019-12-12T19:54:50.589" v="568" actId="1076"/>
+        <pc:sldMkLst>
+          <pc:docMk/>
+          <pc:sldMk cId="1216451595" sldId="272"/>
+        </pc:sldMkLst>
+        <pc:spChg chg="del">
+          <ac:chgData name="Frederick, Kendra" userId="46b225b0-66c1-4c45-b146-80e8e800b3c0" providerId="ADAL" clId="{2E07F154-E418-48D3-B9C3-C5A2B3AD439E}" dt="2019-12-12T19:44:16.196" v="302" actId="478"/>
+          <ac:spMkLst>
+            <pc:docMk/>
+            <pc:sldMk cId="1216451595" sldId="272"/>
+            <ac:spMk id="2" creationId="{72C04FA7-D00B-4565-9660-2F245885C78A}"/>
+          </ac:spMkLst>
+        </pc:spChg>
+        <pc:spChg chg="del">
+          <ac:chgData name="Frederick, Kendra" userId="46b225b0-66c1-4c45-b146-80e8e800b3c0" providerId="ADAL" clId="{2E07F154-E418-48D3-B9C3-C5A2B3AD439E}" dt="2019-12-12T19:44:23.870" v="306"/>
+          <ac:spMkLst>
+            <pc:docMk/>
+            <pc:sldMk cId="1216451595" sldId="272"/>
+            <ac:spMk id="3" creationId="{F424771E-0CA0-4109-B708-90311943A27D}"/>
+          </ac:spMkLst>
+        </pc:spChg>
+        <pc:spChg chg="del">
+          <ac:chgData name="Frederick, Kendra" userId="46b225b0-66c1-4c45-b146-80e8e800b3c0" providerId="ADAL" clId="{2E07F154-E418-48D3-B9C3-C5A2B3AD439E}" dt="2019-12-12T19:44:23.870" v="306"/>
+          <ac:spMkLst>
+            <pc:docMk/>
+            <pc:sldMk cId="1216451595" sldId="272"/>
+            <ac:spMk id="4" creationId="{29680FB5-1D11-470E-86DA-0EFC7E64B420}"/>
+          </ac:spMkLst>
+        </pc:spChg>
+        <pc:spChg chg="add mod">
+          <ac:chgData name="Frederick, Kendra" userId="46b225b0-66c1-4c45-b146-80e8e800b3c0" providerId="ADAL" clId="{2E07F154-E418-48D3-B9C3-C5A2B3AD439E}" dt="2019-12-12T19:44:43.044" v="330" actId="20577"/>
+          <ac:spMkLst>
+            <pc:docMk/>
+            <pc:sldMk cId="1216451595" sldId="272"/>
+            <ac:spMk id="5" creationId="{B32553F3-BEDA-4AA5-A4E2-831465E9023E}"/>
+          </ac:spMkLst>
+        </pc:spChg>
+        <pc:picChg chg="add del mod">
+          <ac:chgData name="Frederick, Kendra" userId="46b225b0-66c1-4c45-b146-80e8e800b3c0" providerId="ADAL" clId="{2E07F154-E418-48D3-B9C3-C5A2B3AD439E}" dt="2019-12-12T19:54:44.359" v="564" actId="478"/>
+          <ac:picMkLst>
+            <pc:docMk/>
+            <pc:sldMk cId="1216451595" sldId="272"/>
+            <ac:picMk id="1026" creationId="{322F43EA-BCFF-49C8-8F8C-D023C92A9344}"/>
+          </ac:picMkLst>
+        </pc:picChg>
+        <pc:picChg chg="add mod">
+          <ac:chgData name="Frederick, Kendra" userId="46b225b0-66c1-4c45-b146-80e8e800b3c0" providerId="ADAL" clId="{2E07F154-E418-48D3-B9C3-C5A2B3AD439E}" dt="2019-12-12T19:54:50.589" v="568" actId="1076"/>
+          <ac:picMkLst>
+            <pc:docMk/>
+            <pc:sldMk cId="1216451595" sldId="272"/>
+            <ac:picMk id="1027" creationId="{B9087D19-6D6D-4A96-91AC-74BBAC3DD9AD}"/>
+          </ac:picMkLst>
+        </pc:picChg>
+      </pc:sldChg>
+      <pc:sldChg chg="addSp delSp modSp add setBg">
+        <pc:chgData name="Frederick, Kendra" userId="46b225b0-66c1-4c45-b146-80e8e800b3c0" providerId="ADAL" clId="{2E07F154-E418-48D3-B9C3-C5A2B3AD439E}" dt="2019-12-12T19:51:11.404" v="487" actId="478"/>
+        <pc:sldMkLst>
+          <pc:docMk/>
+          <pc:sldMk cId="2805601405" sldId="273"/>
+        </pc:sldMkLst>
+        <pc:spChg chg="del">
+          <ac:chgData name="Frederick, Kendra" userId="46b225b0-66c1-4c45-b146-80e8e800b3c0" providerId="ADAL" clId="{2E07F154-E418-48D3-B9C3-C5A2B3AD439E}" dt="2019-12-12T19:50:44.595" v="473"/>
+          <ac:spMkLst>
+            <pc:docMk/>
+            <pc:sldMk cId="2805601405" sldId="273"/>
+            <ac:spMk id="2" creationId="{ECF57FC3-7995-410E-8982-5298C725A146}"/>
+          </ac:spMkLst>
+        </pc:spChg>
+        <pc:spChg chg="del">
+          <ac:chgData name="Frederick, Kendra" userId="46b225b0-66c1-4c45-b146-80e8e800b3c0" providerId="ADAL" clId="{2E07F154-E418-48D3-B9C3-C5A2B3AD439E}" dt="2019-12-12T19:50:44.595" v="473"/>
+          <ac:spMkLst>
+            <pc:docMk/>
+            <pc:sldMk cId="2805601405" sldId="273"/>
+            <ac:spMk id="3" creationId="{7D7E728A-B747-462F-BA8E-4AB9D9F63048}"/>
+          </ac:spMkLst>
+        </pc:spChg>
+        <pc:spChg chg="add mod">
+          <ac:chgData name="Frederick, Kendra" userId="46b225b0-66c1-4c45-b146-80e8e800b3c0" providerId="ADAL" clId="{2E07F154-E418-48D3-B9C3-C5A2B3AD439E}" dt="2019-12-12T19:51:07.132" v="486" actId="20577"/>
+          <ac:spMkLst>
+            <pc:docMk/>
+            <pc:sldMk cId="2805601405" sldId="273"/>
+            <ac:spMk id="4" creationId="{5C0CD122-E347-4361-AE07-E7011642E845}"/>
+          </ac:spMkLst>
+        </pc:spChg>
+        <pc:spChg chg="add del mod">
+          <ac:chgData name="Frederick, Kendra" userId="46b225b0-66c1-4c45-b146-80e8e800b3c0" providerId="ADAL" clId="{2E07F154-E418-48D3-B9C3-C5A2B3AD439E}" dt="2019-12-12T19:51:11.404" v="487" actId="478"/>
+          <ac:spMkLst>
+            <pc:docMk/>
+            <pc:sldMk cId="2805601405" sldId="273"/>
+            <ac:spMk id="5" creationId="{3A342AC3-C609-4A20-9776-324A4F41F169}"/>
+          </ac:spMkLst>
+        </pc:spChg>
+      </pc:sldChg>
+      <pc:sldChg chg="addSp delSp modSp add ord">
+        <pc:chgData name="Frederick, Kendra" userId="46b225b0-66c1-4c45-b146-80e8e800b3c0" providerId="ADAL" clId="{2E07F154-E418-48D3-B9C3-C5A2B3AD439E}" dt="2019-12-12T19:58:44.444" v="578"/>
+        <pc:sldMkLst>
+          <pc:docMk/>
+          <pc:sldMk cId="237996111" sldId="274"/>
+        </pc:sldMkLst>
+        <pc:spChg chg="mod">
+          <ac:chgData name="Frederick, Kendra" userId="46b225b0-66c1-4c45-b146-80e8e800b3c0" providerId="ADAL" clId="{2E07F154-E418-48D3-B9C3-C5A2B3AD439E}" dt="2019-12-12T19:58:37.176" v="576" actId="1076"/>
+          <ac:spMkLst>
+            <pc:docMk/>
+            <pc:sldMk cId="237996111" sldId="274"/>
+            <ac:spMk id="2" creationId="{4AACECB1-D033-4E4B-9751-7F74CDB85CE2}"/>
+          </ac:spMkLst>
+        </pc:spChg>
+        <pc:spChg chg="del">
+          <ac:chgData name="Frederick, Kendra" userId="46b225b0-66c1-4c45-b146-80e8e800b3c0" providerId="ADAL" clId="{2E07F154-E418-48D3-B9C3-C5A2B3AD439E}" dt="2019-12-12T19:52:12.219" v="563"/>
+          <ac:spMkLst>
+            <pc:docMk/>
+            <pc:sldMk cId="237996111" sldId="274"/>
+            <ac:spMk id="3" creationId="{C02BBFEA-55DC-42CF-BA0A-DF1CDE500936}"/>
+          </ac:spMkLst>
+        </pc:spChg>
+        <pc:spChg chg="del">
+          <ac:chgData name="Frederick, Kendra" userId="46b225b0-66c1-4c45-b146-80e8e800b3c0" providerId="ADAL" clId="{2E07F154-E418-48D3-B9C3-C5A2B3AD439E}" dt="2019-12-12T19:52:12.219" v="563"/>
+          <ac:spMkLst>
+            <pc:docMk/>
+            <pc:sldMk cId="237996111" sldId="274"/>
+            <ac:spMk id="4" creationId="{F6D0AF42-1391-472B-BA13-EDC2D6A23AA6}"/>
+          </ac:spMkLst>
+        </pc:spChg>
+        <pc:picChg chg="add mod">
+          <ac:chgData name="Frederick, Kendra" userId="46b225b0-66c1-4c45-b146-80e8e800b3c0" providerId="ADAL" clId="{2E07F154-E418-48D3-B9C3-C5A2B3AD439E}" dt="2019-12-12T19:58:13.052" v="570" actId="1076"/>
+          <ac:picMkLst>
+            <pc:docMk/>
+            <pc:sldMk cId="237996111" sldId="274"/>
+            <ac:picMk id="2050" creationId="{31AAF0CE-4883-4015-9C37-D59A97FFCEC5}"/>
+          </ac:picMkLst>
+        </pc:picChg>
+      </pc:sldChg>
+    </pc:docChg>
+  </pc:docChgLst>
+</pc:chgInfo>
+</file>
+
 <file path=ppt/notesMasters/notesMaster1.xml><?xml version="1.0" encoding="utf-8"?>
 <p:notesMaster xmlns:a="http://schemas.openxmlformats.org/drawingml/2006/main" xmlns:r="http://schemas.openxmlformats.org/officeDocument/2006/relationships" xmlns:p="http://schemas.openxmlformats.org/presentationml/2006/main">
   <p:cSld>
@@ -211,7 +690,7 @@
           </a:lstStyle>
           <a:p>
             <a:fld id="{8720514E-8D2F-1C4D-8E27-1D1EA480D016}" type="datetimeFigureOut">
-              <a:t>12/10/19</a:t>
+              <a:t>12/12/2019</a:t>
             </a:fld>
             <a:endParaRPr lang="en-US"/>
           </a:p>
@@ -819,6 +1298,93 @@
           <a:lstStyle/>
           <a:p>
             <a:r>
+              <a:rPr lang="en-US" dirty="0"/>
+              <a:t>As none are categorical, we can trust these FI’s.</a:t>
+            </a:r>
+          </a:p>
+        </p:txBody>
+      </p:sp>
+      <p:sp>
+        <p:nvSpPr>
+          <p:cNvPr id="4" name="Slide Number Placeholder 3"/>
+          <p:cNvSpPr>
+            <a:spLocks noGrp="1"/>
+          </p:cNvSpPr>
+          <p:nvPr>
+            <p:ph type="sldNum" sz="quarter" idx="5"/>
+          </p:nvPr>
+        </p:nvSpPr>
+        <p:spPr/>
+        <p:txBody>
+          <a:bodyPr/>
+          <a:lstStyle/>
+          <a:p>
+            <a:fld id="{0108ECC4-B911-874A-9B65-750057DA25D0}" type="slidenum">
+              <a:rPr lang="en-US" smtClean="0"/>
+              <a:t>12</a:t>
+            </a:fld>
+            <a:endParaRPr lang="en-US"/>
+          </a:p>
+        </p:txBody>
+      </p:sp>
+    </p:spTree>
+    <p:extLst>
+      <p:ext uri="{BB962C8B-B14F-4D97-AF65-F5344CB8AC3E}">
+        <p14:creationId xmlns:p14="http://schemas.microsoft.com/office/powerpoint/2010/main" val="3124326945"/>
+      </p:ext>
+    </p:extLst>
+  </p:cSld>
+  <p:clrMapOvr>
+    <a:masterClrMapping/>
+  </p:clrMapOvr>
+</p:notes>
+</file>
+
+<file path=ppt/notesSlides/notesSlide4.xml><?xml version="1.0" encoding="utf-8"?>
+<p:notes xmlns:a="http://schemas.openxmlformats.org/drawingml/2006/main" xmlns:r="http://schemas.openxmlformats.org/officeDocument/2006/relationships" xmlns:p="http://schemas.openxmlformats.org/presentationml/2006/main">
+  <p:cSld>
+    <p:spTree>
+      <p:nvGrpSpPr>
+        <p:cNvPr id="1" name=""/>
+        <p:cNvGrpSpPr/>
+        <p:nvPr/>
+      </p:nvGrpSpPr>
+      <p:grpSpPr>
+        <a:xfrm>
+          <a:off x="0" y="0"/>
+          <a:ext cx="0" cy="0"/>
+          <a:chOff x="0" y="0"/>
+          <a:chExt cx="0" cy="0"/>
+        </a:xfrm>
+      </p:grpSpPr>
+      <p:sp>
+        <p:nvSpPr>
+          <p:cNvPr id="2" name="Slide Image Placeholder 1"/>
+          <p:cNvSpPr>
+            <a:spLocks noGrp="1" noRot="1" noChangeAspect="1"/>
+          </p:cNvSpPr>
+          <p:nvPr>
+            <p:ph type="sldImg"/>
+          </p:nvPr>
+        </p:nvSpPr>
+        <p:spPr/>
+      </p:sp>
+      <p:sp>
+        <p:nvSpPr>
+          <p:cNvPr id="3" name="Notes Placeholder 2"/>
+          <p:cNvSpPr>
+            <a:spLocks noGrp="1"/>
+          </p:cNvSpPr>
+          <p:nvPr>
+            <p:ph type="body" idx="1"/>
+          </p:nvPr>
+        </p:nvSpPr>
+        <p:spPr/>
+        <p:txBody>
+          <a:bodyPr/>
+          <a:lstStyle/>
+          <a:p>
+            <a:r>
               <a:rPr lang="en-US"/>
               <a:t>Page Rank: / # search results for domain / Alexa Rank</a:t>
             </a:r>
@@ -841,7 +1407,7 @@
           <a:lstStyle/>
           <a:p>
             <a:fld id="{0108ECC4-B911-874A-9B65-750057DA25D0}" type="slidenum">
-              <a:t>12</a:t>
+              <a:t>14</a:t>
             </a:fld>
             <a:endParaRPr lang="en-US"/>
           </a:p>
@@ -1012,7 +1578,7 @@
           <a:lstStyle/>
           <a:p>
             <a:fld id="{25AA2725-C980-9E41-8C67-2E94227B55D7}" type="datetimeFigureOut">
-              <a:t>12/10/19</a:t>
+              <a:t>12/12/2019</a:t>
             </a:fld>
             <a:endParaRPr lang="en-US"/>
           </a:p>
@@ -1178,7 +1744,7 @@
           <a:lstStyle/>
           <a:p>
             <a:fld id="{25AA2725-C980-9E41-8C67-2E94227B55D7}" type="datetimeFigureOut">
-              <a:t>12/10/19</a:t>
+              <a:t>12/12/2019</a:t>
             </a:fld>
             <a:endParaRPr lang="en-US"/>
           </a:p>
@@ -1354,7 +1920,7 @@
           <a:lstStyle/>
           <a:p>
             <a:fld id="{25AA2725-C980-9E41-8C67-2E94227B55D7}" type="datetimeFigureOut">
-              <a:t>12/10/19</a:t>
+              <a:t>12/12/2019</a:t>
             </a:fld>
             <a:endParaRPr lang="en-US"/>
           </a:p>
@@ -1520,7 +2086,7 @@
           <a:lstStyle/>
           <a:p>
             <a:fld id="{25AA2725-C980-9E41-8C67-2E94227B55D7}" type="datetimeFigureOut">
-              <a:t>12/10/19</a:t>
+              <a:t>12/12/2019</a:t>
             </a:fld>
             <a:endParaRPr lang="en-US"/>
           </a:p>
@@ -1777,7 +2343,7 @@
           <a:lstStyle/>
           <a:p>
             <a:fld id="{25AA2725-C980-9E41-8C67-2E94227B55D7}" type="datetimeFigureOut">
-              <a:t>12/10/19</a:t>
+              <a:t>12/12/2019</a:t>
             </a:fld>
             <a:endParaRPr lang="en-US"/>
           </a:p>
@@ -2004,7 +2570,7 @@
           <a:lstStyle/>
           <a:p>
             <a:fld id="{25AA2725-C980-9E41-8C67-2E94227B55D7}" type="datetimeFigureOut">
-              <a:t>12/10/19</a:t>
+              <a:t>12/12/2019</a:t>
             </a:fld>
             <a:endParaRPr lang="en-US"/>
           </a:p>
@@ -2359,7 +2925,7 @@
           <a:lstStyle/>
           <a:p>
             <a:fld id="{25AA2725-C980-9E41-8C67-2E94227B55D7}" type="datetimeFigureOut">
-              <a:t>12/10/19</a:t>
+              <a:t>12/12/2019</a:t>
             </a:fld>
             <a:endParaRPr lang="en-US"/>
           </a:p>
@@ -2496,7 +3062,7 @@
           <a:lstStyle/>
           <a:p>
             <a:fld id="{25AA2725-C980-9E41-8C67-2E94227B55D7}" type="datetimeFigureOut">
-              <a:t>12/10/19</a:t>
+              <a:t>12/12/2019</a:t>
             </a:fld>
             <a:endParaRPr lang="en-US"/>
           </a:p>
@@ -2589,7 +3155,7 @@
           <a:lstStyle/>
           <a:p>
             <a:fld id="{25AA2725-C980-9E41-8C67-2E94227B55D7}" type="datetimeFigureOut">
-              <a:t>12/10/19</a:t>
+              <a:t>12/12/2019</a:t>
             </a:fld>
             <a:endParaRPr lang="en-US"/>
           </a:p>
@@ -2942,7 +3508,7 @@
           <a:lstStyle/>
           <a:p>
             <a:fld id="{25AA2725-C980-9E41-8C67-2E94227B55D7}" type="datetimeFigureOut">
-              <a:t>12/10/19</a:t>
+              <a:t>12/12/2019</a:t>
             </a:fld>
             <a:endParaRPr lang="en-US"/>
           </a:p>
@@ -3295,7 +3861,7 @@
           </a:lstStyle>
           <a:p>
             <a:fld id="{25AA2725-C980-9E41-8C67-2E94227B55D7}" type="datetimeFigureOut">
-              <a:t>12/10/19</a:t>
+              <a:t>12/12/2019</a:t>
             </a:fld>
             <a:endParaRPr lang="en-US"/>
           </a:p>
@@ -3533,7 +4099,7 @@
           </a:lstStyle>
           <a:p>
             <a:fld id="{25AA2725-C980-9E41-8C67-2E94227B55D7}" type="datetimeFigureOut">
-              <a:t>12/10/19</a:t>
+              <a:t>12/12/2019</a:t>
             </a:fld>
             <a:endParaRPr lang="en-US"/>
           </a:p>
@@ -4084,6 +4650,430 @@
           <a:chExt cx="0" cy="0"/>
         </a:xfrm>
       </p:grpSpPr>
+      <p:sp>
+        <p:nvSpPr>
+          <p:cNvPr id="2" name="Title 1">
+            <a:extLst>
+              <a:ext uri="{FF2B5EF4-FFF2-40B4-BE49-F238E27FC236}">
+                <a16:creationId xmlns:a16="http://schemas.microsoft.com/office/drawing/2014/main" id="{20F3B432-91FC-0042-80AA-F8DA114FD276}"/>
+              </a:ext>
+            </a:extLst>
+          </p:cNvPr>
+          <p:cNvSpPr>
+            <a:spLocks noGrp="1"/>
+          </p:cNvSpPr>
+          <p:nvPr>
+            <p:ph type="title"/>
+          </p:nvPr>
+        </p:nvSpPr>
+        <p:spPr>
+          <a:xfrm>
+            <a:off x="2286000" y="457200"/>
+            <a:ext cx="7772400" cy="914400"/>
+          </a:xfrm>
+        </p:spPr>
+        <p:txBody>
+          <a:bodyPr/>
+          <a:lstStyle/>
+          <a:p>
+            <a:r>
+              <a:rPr lang="en-US"/>
+              <a:t>Final Model evaluation</a:t>
+            </a:r>
+          </a:p>
+        </p:txBody>
+      </p:sp>
+      <p:pic>
+        <p:nvPicPr>
+          <p:cNvPr id="4" name="Picture 3">
+            <a:extLst>
+              <a:ext uri="{FF2B5EF4-FFF2-40B4-BE49-F238E27FC236}">
+                <a16:creationId xmlns:a16="http://schemas.microsoft.com/office/drawing/2014/main" id="{4AD2803C-3889-984E-A36E-24A43FAFAC5A}"/>
+              </a:ext>
+            </a:extLst>
+          </p:cNvPr>
+          <p:cNvPicPr>
+            <a:picLocks noChangeAspect="1"/>
+          </p:cNvPicPr>
+          <p:nvPr/>
+        </p:nvPicPr>
+        <p:blipFill>
+          <a:blip r:embed="rId2"/>
+          <a:stretch>
+            <a:fillRect/>
+          </a:stretch>
+        </p:blipFill>
+        <p:spPr>
+          <a:xfrm>
+            <a:off x="949203" y="2329005"/>
+            <a:ext cx="4912893" cy="3643533"/>
+          </a:xfrm>
+          <a:prstGeom prst="rect">
+            <a:avLst/>
+          </a:prstGeom>
+        </p:spPr>
+      </p:pic>
+      <p:pic>
+        <p:nvPicPr>
+          <p:cNvPr id="5" name="Picture 4">
+            <a:extLst>
+              <a:ext uri="{FF2B5EF4-FFF2-40B4-BE49-F238E27FC236}">
+                <a16:creationId xmlns:a16="http://schemas.microsoft.com/office/drawing/2014/main" id="{2B58AB24-F64E-B94C-8013-848E657FECB2}"/>
+              </a:ext>
+            </a:extLst>
+          </p:cNvPr>
+          <p:cNvPicPr>
+            <a:picLocks noChangeAspect="1"/>
+          </p:cNvPicPr>
+          <p:nvPr/>
+        </p:nvPicPr>
+        <p:blipFill>
+          <a:blip r:embed="rId3"/>
+          <a:stretch>
+            <a:fillRect/>
+          </a:stretch>
+        </p:blipFill>
+        <p:spPr>
+          <a:xfrm>
+            <a:off x="6096000" y="2329004"/>
+            <a:ext cx="4998750" cy="3643533"/>
+          </a:xfrm>
+          <a:prstGeom prst="rect">
+            <a:avLst/>
+          </a:prstGeom>
+        </p:spPr>
+      </p:pic>
+      <p:sp>
+        <p:nvSpPr>
+          <p:cNvPr id="6" name="TextBox 5">
+            <a:extLst>
+              <a:ext uri="{FF2B5EF4-FFF2-40B4-BE49-F238E27FC236}">
+                <a16:creationId xmlns:a16="http://schemas.microsoft.com/office/drawing/2014/main" id="{33004B51-27C5-224A-A85C-1F2D5987C8DC}"/>
+              </a:ext>
+            </a:extLst>
+          </p:cNvPr>
+          <p:cNvSpPr txBox="1"/>
+          <p:nvPr/>
+        </p:nvSpPr>
+        <p:spPr>
+          <a:xfrm>
+            <a:off x="2106592" y="1770927"/>
+            <a:ext cx="2620461" cy="369332"/>
+          </a:xfrm>
+          <a:prstGeom prst="rect">
+            <a:avLst/>
+          </a:prstGeom>
+          <a:noFill/>
+        </p:spPr>
+        <p:txBody>
+          <a:bodyPr wrap="none" rtlCol="0">
+            <a:spAutoFit/>
+          </a:bodyPr>
+          <a:lstStyle/>
+          <a:p>
+            <a:r>
+              <a:rPr lang="en-US" b="1"/>
+              <a:t>Precision-Recall Curve</a:t>
+            </a:r>
+          </a:p>
+        </p:txBody>
+      </p:sp>
+      <p:sp>
+        <p:nvSpPr>
+          <p:cNvPr id="7" name="TextBox 6">
+            <a:extLst>
+              <a:ext uri="{FF2B5EF4-FFF2-40B4-BE49-F238E27FC236}">
+                <a16:creationId xmlns:a16="http://schemas.microsoft.com/office/drawing/2014/main" id="{419ECF04-9BCA-D04B-8C2A-32C4A2864F4E}"/>
+              </a:ext>
+            </a:extLst>
+          </p:cNvPr>
+          <p:cNvSpPr txBox="1"/>
+          <p:nvPr/>
+        </p:nvSpPr>
+        <p:spPr>
+          <a:xfrm>
+            <a:off x="7162450" y="1770927"/>
+            <a:ext cx="2865849" cy="369332"/>
+          </a:xfrm>
+          <a:prstGeom prst="rect">
+            <a:avLst/>
+          </a:prstGeom>
+          <a:noFill/>
+        </p:spPr>
+        <p:txBody>
+          <a:bodyPr wrap="none" rtlCol="0">
+            <a:spAutoFit/>
+          </a:bodyPr>
+          <a:lstStyle/>
+          <a:p>
+            <a:r>
+              <a:rPr lang="en-US" b="1"/>
+              <a:t>Cost Function (example)</a:t>
+            </a:r>
+          </a:p>
+        </p:txBody>
+      </p:sp>
+      <p:cxnSp>
+        <p:nvCxnSpPr>
+          <p:cNvPr id="8" name="Straight Arrow Connector 7">
+            <a:extLst>
+              <a:ext uri="{FF2B5EF4-FFF2-40B4-BE49-F238E27FC236}">
+                <a16:creationId xmlns:a16="http://schemas.microsoft.com/office/drawing/2014/main" id="{FFDE9F7A-E505-4DFA-ADAB-B9A87C1841F8}"/>
+              </a:ext>
+            </a:extLst>
+          </p:cNvPr>
+          <p:cNvCxnSpPr>
+            <a:cxnSpLocks/>
+          </p:cNvCxnSpPr>
+          <p:nvPr/>
+        </p:nvCxnSpPr>
+        <p:spPr>
+          <a:xfrm flipH="1">
+            <a:off x="8078874" y="4411226"/>
+            <a:ext cx="241159" cy="713433"/>
+          </a:xfrm>
+          <a:prstGeom prst="straightConnector1">
+            <a:avLst/>
+          </a:prstGeom>
+          <a:ln>
+            <a:tailEnd type="triangle"/>
+          </a:ln>
+        </p:spPr>
+        <p:style>
+          <a:lnRef idx="3">
+            <a:schemeClr val="accent1"/>
+          </a:lnRef>
+          <a:fillRef idx="0">
+            <a:schemeClr val="accent1"/>
+          </a:fillRef>
+          <a:effectRef idx="2">
+            <a:schemeClr val="accent1"/>
+          </a:effectRef>
+          <a:fontRef idx="minor">
+            <a:schemeClr val="tx1"/>
+          </a:fontRef>
+        </p:style>
+      </p:cxnSp>
+      <p:sp>
+        <p:nvSpPr>
+          <p:cNvPr id="9" name="TextBox 8">
+            <a:extLst>
+              <a:ext uri="{FF2B5EF4-FFF2-40B4-BE49-F238E27FC236}">
+                <a16:creationId xmlns:a16="http://schemas.microsoft.com/office/drawing/2014/main" id="{B1E03ED9-7343-4299-949E-3787B69E188A}"/>
+              </a:ext>
+            </a:extLst>
+          </p:cNvPr>
+          <p:cNvSpPr txBox="1"/>
+          <p:nvPr/>
+        </p:nvSpPr>
+        <p:spPr>
+          <a:xfrm>
+            <a:off x="8259745" y="4122140"/>
+            <a:ext cx="2558906" cy="369332"/>
+          </a:xfrm>
+          <a:prstGeom prst="rect">
+            <a:avLst/>
+          </a:prstGeom>
+          <a:noFill/>
+        </p:spPr>
+        <p:txBody>
+          <a:bodyPr wrap="none" rtlCol="0">
+            <a:spAutoFit/>
+          </a:bodyPr>
+          <a:lstStyle/>
+          <a:p>
+            <a:r>
+              <a:rPr lang="en-US" dirty="0">
+                <a:solidFill>
+                  <a:schemeClr val="accent1"/>
+                </a:solidFill>
+              </a:rPr>
+              <a:t>Optimal threshold = 0.20</a:t>
+            </a:r>
+          </a:p>
+        </p:txBody>
+      </p:sp>
+      <p:sp>
+        <p:nvSpPr>
+          <p:cNvPr id="14" name="Oval 13">
+            <a:extLst>
+              <a:ext uri="{FF2B5EF4-FFF2-40B4-BE49-F238E27FC236}">
+                <a16:creationId xmlns:a16="http://schemas.microsoft.com/office/drawing/2014/main" id="{9D3F5DA9-3C32-4971-99A2-D697CBCEBA98}"/>
+              </a:ext>
+            </a:extLst>
+          </p:cNvPr>
+          <p:cNvSpPr/>
+          <p:nvPr/>
+        </p:nvSpPr>
+        <p:spPr>
+          <a:xfrm>
+            <a:off x="2401557" y="2692958"/>
+            <a:ext cx="200967" cy="200967"/>
+          </a:xfrm>
+          <a:prstGeom prst="ellipse">
+            <a:avLst/>
+          </a:prstGeom>
+        </p:spPr>
+        <p:style>
+          <a:lnRef idx="2">
+            <a:schemeClr val="accent1">
+              <a:shade val="50000"/>
+            </a:schemeClr>
+          </a:lnRef>
+          <a:fillRef idx="1">
+            <a:schemeClr val="accent1"/>
+          </a:fillRef>
+          <a:effectRef idx="0">
+            <a:schemeClr val="accent1"/>
+          </a:effectRef>
+          <a:fontRef idx="minor">
+            <a:schemeClr val="lt1"/>
+          </a:fontRef>
+        </p:style>
+        <p:txBody>
+          <a:bodyPr rtlCol="0" anchor="ctr"/>
+          <a:lstStyle/>
+          <a:p>
+            <a:pPr algn="ctr"/>
+            <a:endParaRPr lang="en-US"/>
+          </a:p>
+        </p:txBody>
+      </p:sp>
+    </p:spTree>
+    <p:extLst>
+      <p:ext uri="{BB962C8B-B14F-4D97-AF65-F5344CB8AC3E}">
+        <p14:creationId xmlns:p14="http://schemas.microsoft.com/office/powerpoint/2010/main" val="3742588891"/>
+      </p:ext>
+    </p:extLst>
+  </p:cSld>
+  <p:clrMapOvr>
+    <a:masterClrMapping/>
+  </p:clrMapOvr>
+  <p:timing>
+    <p:tnLst>
+      <p:par>
+        <p:cTn id="1" dur="indefinite" restart="never" nodeType="tmRoot">
+          <p:childTnLst>
+            <p:seq concurrent="1" nextAc="seek">
+              <p:cTn id="2" dur="indefinite" nodeType="mainSeq">
+                <p:childTnLst>
+                  <p:par>
+                    <p:cTn id="3" fill="hold">
+                      <p:stCondLst>
+                        <p:cond delay="indefinite"/>
+                      </p:stCondLst>
+                      <p:childTnLst>
+                        <p:par>
+                          <p:cTn id="4" fill="hold">
+                            <p:stCondLst>
+                              <p:cond delay="0"/>
+                            </p:stCondLst>
+                            <p:childTnLst>
+                              <p:par>
+                                <p:cTn id="5" presetID="1" presetClass="entr" presetSubtype="0" fill="hold" grpId="0" nodeType="clickEffect">
+                                  <p:stCondLst>
+                                    <p:cond delay="0"/>
+                                  </p:stCondLst>
+                                  <p:childTnLst>
+                                    <p:set>
+                                      <p:cBhvr>
+                                        <p:cTn id="6" dur="1" fill="hold">
+                                          <p:stCondLst>
+                                            <p:cond delay="0"/>
+                                          </p:stCondLst>
+                                        </p:cTn>
+                                        <p:tgtEl>
+                                          <p:spTgt spid="9"/>
+                                        </p:tgtEl>
+                                        <p:attrNameLst>
+                                          <p:attrName>style.visibility</p:attrName>
+                                        </p:attrNameLst>
+                                      </p:cBhvr>
+                                      <p:to>
+                                        <p:strVal val="visible"/>
+                                      </p:to>
+                                    </p:set>
+                                  </p:childTnLst>
+                                </p:cTn>
+                              </p:par>
+                              <p:par>
+                                <p:cTn id="7" presetID="1" presetClass="entr" presetSubtype="0" fill="hold" nodeType="withEffect">
+                                  <p:stCondLst>
+                                    <p:cond delay="0"/>
+                                  </p:stCondLst>
+                                  <p:childTnLst>
+                                    <p:set>
+                                      <p:cBhvr>
+                                        <p:cTn id="8" dur="1" fill="hold">
+                                          <p:stCondLst>
+                                            <p:cond delay="0"/>
+                                          </p:stCondLst>
+                                        </p:cTn>
+                                        <p:tgtEl>
+                                          <p:spTgt spid="8"/>
+                                        </p:tgtEl>
+                                        <p:attrNameLst>
+                                          <p:attrName>style.visibility</p:attrName>
+                                        </p:attrNameLst>
+                                      </p:cBhvr>
+                                      <p:to>
+                                        <p:strVal val="visible"/>
+                                      </p:to>
+                                    </p:set>
+                                  </p:childTnLst>
+                                </p:cTn>
+                              </p:par>
+                            </p:childTnLst>
+                          </p:cTn>
+                        </p:par>
+                      </p:childTnLst>
+                    </p:cTn>
+                  </p:par>
+                </p:childTnLst>
+              </p:cTn>
+              <p:prevCondLst>
+                <p:cond evt="onPrev" delay="0">
+                  <p:tgtEl>
+                    <p:sldTgt/>
+                  </p:tgtEl>
+                </p:cond>
+              </p:prevCondLst>
+              <p:nextCondLst>
+                <p:cond evt="onNext" delay="0">
+                  <p:tgtEl>
+                    <p:sldTgt/>
+                  </p:tgtEl>
+                </p:cond>
+              </p:nextCondLst>
+            </p:seq>
+          </p:childTnLst>
+        </p:cTn>
+      </p:par>
+    </p:tnLst>
+    <p:bldLst>
+      <p:bldP spid="9" grpId="0"/>
+    </p:bldLst>
+  </p:timing>
+</p:sld>
+</file>
+
+<file path=ppt/slides/slide11.xml><?xml version="1.0" encoding="utf-8"?>
+<p:sld xmlns:a="http://schemas.openxmlformats.org/drawingml/2006/main" xmlns:r="http://schemas.openxmlformats.org/officeDocument/2006/relationships" xmlns:p="http://schemas.openxmlformats.org/presentationml/2006/main">
+  <p:cSld>
+    <p:spTree>
+      <p:nvGrpSpPr>
+        <p:cNvPr id="1" name=""/>
+        <p:cNvGrpSpPr/>
+        <p:nvPr/>
+      </p:nvGrpSpPr>
+      <p:grpSpPr>
+        <a:xfrm>
+          <a:off x="0" y="0"/>
+          <a:ext cx="0" cy="0"/>
+          <a:chOff x="0" y="0"/>
+          <a:chExt cx="0" cy="0"/>
+        </a:xfrm>
+      </p:grpSpPr>
       <p:pic>
         <p:nvPicPr>
           <p:cNvPr id="6" name="Picture 5">
@@ -4133,12 +5123,12 @@
         <p:spPr>
           <a:xfrm>
             <a:off x="2286000" y="457200"/>
-            <a:ext cx="7772400" cy="731520"/>
+            <a:ext cx="7772400" cy="914400"/>
           </a:xfrm>
         </p:spPr>
         <p:txBody>
           <a:bodyPr>
-            <a:normAutofit fontScale="90000"/>
+            <a:normAutofit/>
           </a:bodyPr>
           <a:lstStyle/>
           <a:p>
@@ -4657,6 +5647,46 @@
           </a:p>
         </p:txBody>
       </p:sp>
+      <p:sp>
+        <p:nvSpPr>
+          <p:cNvPr id="12" name="TextBox 11">
+            <a:extLst>
+              <a:ext uri="{FF2B5EF4-FFF2-40B4-BE49-F238E27FC236}">
+                <a16:creationId xmlns:a16="http://schemas.microsoft.com/office/drawing/2014/main" id="{7526FCEF-F772-4807-80FD-3E9E5A79CF46}"/>
+              </a:ext>
+            </a:extLst>
+          </p:cNvPr>
+          <p:cNvSpPr txBox="1"/>
+          <p:nvPr/>
+        </p:nvSpPr>
+        <p:spPr>
+          <a:xfrm>
+            <a:off x="2922734" y="5980724"/>
+            <a:ext cx="1795876" cy="369332"/>
+          </a:xfrm>
+          <a:prstGeom prst="rect">
+            <a:avLst/>
+          </a:prstGeom>
+          <a:noFill/>
+        </p:spPr>
+        <p:txBody>
+          <a:bodyPr wrap="none" rtlCol="0">
+            <a:spAutoFit/>
+          </a:bodyPr>
+          <a:lstStyle/>
+          <a:p>
+            <a:pPr algn="ctr"/>
+            <a:r>
+              <a:rPr lang="en-US" dirty="0">
+                <a:solidFill>
+                  <a:schemeClr val="accent6"/>
+                </a:solidFill>
+              </a:rPr>
+              <a:t>Threshold = 0.20</a:t>
+            </a:r>
+          </a:p>
+        </p:txBody>
+      </p:sp>
     </p:spTree>
     <p:extLst>
       <p:ext uri="{BB962C8B-B14F-4D97-AF65-F5344CB8AC3E}">
@@ -4667,116 +5697,84 @@
   <p:clrMapOvr>
     <a:masterClrMapping/>
   </p:clrMapOvr>
-</p:sld>
-</file>
-
-<file path=ppt/slides/slide11.xml><?xml version="1.0" encoding="utf-8"?>
-<p:sld xmlns:a="http://schemas.openxmlformats.org/drawingml/2006/main" xmlns:r="http://schemas.openxmlformats.org/officeDocument/2006/relationships" xmlns:p="http://schemas.openxmlformats.org/presentationml/2006/main">
-  <p:cSld>
-    <p:spTree>
-      <p:nvGrpSpPr>
-        <p:cNvPr id="1" name=""/>
-        <p:cNvGrpSpPr/>
-        <p:nvPr/>
-      </p:nvGrpSpPr>
-      <p:grpSpPr>
-        <a:xfrm>
-          <a:off x="0" y="0"/>
-          <a:ext cx="0" cy="0"/>
-          <a:chOff x="0" y="0"/>
-          <a:chExt cx="0" cy="0"/>
-        </a:xfrm>
-      </p:grpSpPr>
-      <p:sp>
-        <p:nvSpPr>
-          <p:cNvPr id="3" name="Content Placeholder 2">
-            <a:extLst>
-              <a:ext uri="{FF2B5EF4-FFF2-40B4-BE49-F238E27FC236}">
-                <a16:creationId xmlns:a16="http://schemas.microsoft.com/office/drawing/2014/main" id="{43B626B8-0930-FD44-B7C4-848F2D2227B0}"/>
-              </a:ext>
-            </a:extLst>
-          </p:cNvPr>
-          <p:cNvSpPr>
-            <a:spLocks noGrp="1"/>
-          </p:cNvSpPr>
-          <p:nvPr>
-            <p:ph idx="1"/>
-          </p:nvPr>
-        </p:nvSpPr>
-        <p:spPr>
-          <a:xfrm>
-            <a:off x="2231136" y="1770928"/>
-            <a:ext cx="7729728" cy="3969100"/>
-          </a:xfrm>
-        </p:spPr>
-        <p:txBody>
-          <a:bodyPr>
-            <a:normAutofit/>
-          </a:bodyPr>
-          <a:lstStyle/>
-          <a:p>
-            <a:r>
-              <a:rPr lang="en-US" sz="2400"/>
-              <a:t>Better randomization of Benign URLs</a:t>
-            </a:r>
-          </a:p>
-          <a:p>
-            <a:r>
-              <a:rPr lang="en-US" sz="2400"/>
-              <a:t>Stack with Multinomial Naïve Bayes model fit on NLP features (TF-IDF of path “tokens”)</a:t>
-            </a:r>
-          </a:p>
-          <a:p>
-            <a:r>
-              <a:rPr lang="en-US" sz="2400"/>
-              <a:t>Additional Features</a:t>
-            </a:r>
-          </a:p>
-        </p:txBody>
-      </p:sp>
-      <p:sp>
-        <p:nvSpPr>
-          <p:cNvPr id="4" name="Title 1">
-            <a:extLst>
-              <a:ext uri="{FF2B5EF4-FFF2-40B4-BE49-F238E27FC236}">
-                <a16:creationId xmlns:a16="http://schemas.microsoft.com/office/drawing/2014/main" id="{98B9FD84-B092-4641-9A99-825B6EAA275B}"/>
-              </a:ext>
-            </a:extLst>
-          </p:cNvPr>
-          <p:cNvSpPr>
-            <a:spLocks noGrp="1"/>
-          </p:cNvSpPr>
-          <p:nvPr>
-            <p:ph type="title"/>
-          </p:nvPr>
-        </p:nvSpPr>
-        <p:spPr>
-          <a:xfrm>
-            <a:off x="2231136" y="501705"/>
-            <a:ext cx="7729728" cy="914400"/>
-          </a:xfrm>
-        </p:spPr>
-        <p:txBody>
-          <a:bodyPr/>
-          <a:lstStyle/>
-          <a:p>
-            <a:r>
-              <a:rPr lang="en-US"/>
-              <a:t>Future work</a:t>
-            </a:r>
-          </a:p>
-        </p:txBody>
-      </p:sp>
-    </p:spTree>
-    <p:extLst>
-      <p:ext uri="{BB962C8B-B14F-4D97-AF65-F5344CB8AC3E}">
-        <p14:creationId xmlns:p14="http://schemas.microsoft.com/office/powerpoint/2010/main" val="393610802"/>
-      </p:ext>
-    </p:extLst>
-  </p:cSld>
-  <p:clrMapOvr>
-    <a:masterClrMapping/>
-  </p:clrMapOvr>
+  <p:timing>
+    <p:tnLst>
+      <p:par>
+        <p:cTn id="1" dur="indefinite" restart="never" nodeType="tmRoot">
+          <p:childTnLst>
+            <p:seq concurrent="1" nextAc="seek">
+              <p:cTn id="2" dur="indefinite" nodeType="mainSeq">
+                <p:childTnLst>
+                  <p:par>
+                    <p:cTn id="3" fill="hold">
+                      <p:stCondLst>
+                        <p:cond delay="indefinite"/>
+                      </p:stCondLst>
+                      <p:childTnLst>
+                        <p:par>
+                          <p:cTn id="4" fill="hold">
+                            <p:stCondLst>
+                              <p:cond delay="0"/>
+                            </p:stCondLst>
+                            <p:childTnLst>
+                              <p:par>
+                                <p:cTn id="5" presetID="1" presetClass="entr" presetSubtype="0" fill="hold" grpId="0" nodeType="clickEffect">
+                                  <p:stCondLst>
+                                    <p:cond delay="0"/>
+                                  </p:stCondLst>
+                                  <p:childTnLst>
+                                    <p:set>
+                                      <p:cBhvr>
+                                        <p:cTn id="6" dur="1" fill="hold">
+                                          <p:stCondLst>
+                                            <p:cond delay="0"/>
+                                          </p:stCondLst>
+                                        </p:cTn>
+                                        <p:tgtEl>
+                                          <p:spTgt spid="12"/>
+                                        </p:tgtEl>
+                                        <p:attrNameLst>
+                                          <p:attrName>style.visibility</p:attrName>
+                                        </p:attrNameLst>
+                                      </p:cBhvr>
+                                      <p:to>
+                                        <p:strVal val="visible"/>
+                                      </p:to>
+                                    </p:set>
+                                  </p:childTnLst>
+                                </p:cTn>
+                              </p:par>
+                            </p:childTnLst>
+                          </p:cTn>
+                        </p:par>
+                      </p:childTnLst>
+                    </p:cTn>
+                  </p:par>
+                </p:childTnLst>
+              </p:cTn>
+              <p:prevCondLst>
+                <p:cond evt="onPrev" delay="0">
+                  <p:tgtEl>
+                    <p:sldTgt/>
+                  </p:tgtEl>
+                </p:cond>
+              </p:prevCondLst>
+              <p:nextCondLst>
+                <p:cond evt="onNext" delay="0">
+                  <p:tgtEl>
+                    <p:sldTgt/>
+                  </p:tgtEl>
+                </p:cond>
+              </p:nextCondLst>
+            </p:seq>
+          </p:childTnLst>
+        </p:cTn>
+      </p:par>
+    </p:tnLst>
+    <p:bldLst>
+      <p:bldP spid="12" grpId="0"/>
+    </p:bldLst>
+  </p:timing>
 </p:sld>
 </file>
 
@@ -4799,10 +5797,10 @@
       </p:grpSpPr>
       <p:sp>
         <p:nvSpPr>
-          <p:cNvPr id="3" name="Content Placeholder 2">
+          <p:cNvPr id="5" name="Title 1">
             <a:extLst>
               <a:ext uri="{FF2B5EF4-FFF2-40B4-BE49-F238E27FC236}">
-                <a16:creationId xmlns:a16="http://schemas.microsoft.com/office/drawing/2014/main" id="{CA683D1B-39FA-8147-A4DF-FA50DB03DEDD}"/>
+                <a16:creationId xmlns:a16="http://schemas.microsoft.com/office/drawing/2014/main" id="{B32553F3-BEDA-4AA5-A4E2-831465E9023E}"/>
               </a:ext>
             </a:extLst>
           </p:cNvPr>
@@ -4810,234 +5808,13 @@
             <a:spLocks noGrp="1"/>
           </p:cNvSpPr>
           <p:nvPr>
-            <p:ph sz="half" idx="1"/>
+            <p:ph type="title"/>
           </p:nvPr>
         </p:nvSpPr>
         <p:spPr>
           <a:xfrm>
-            <a:off x="1581912" y="2075935"/>
-            <a:ext cx="4271771" cy="3991233"/>
-          </a:xfrm>
-        </p:spPr>
-        <p:txBody>
-          <a:bodyPr>
-            <a:normAutofit lnSpcReduction="10000"/>
-          </a:bodyPr>
-          <a:lstStyle/>
-          <a:p>
-            <a:r>
-              <a:rPr lang="en-US"/>
-              <a:t>Additional URL-based features</a:t>
-            </a:r>
-          </a:p>
-          <a:p>
-            <a:pPr lvl="1"/>
-            <a:r>
-              <a:rPr lang="en-US"/>
-              <a:t>Levenshtein distance from English (other language?) word</a:t>
-            </a:r>
-          </a:p>
-          <a:p>
-            <a:pPr lvl="1"/>
-            <a:r>
-              <a:rPr lang="en-US"/>
-              <a:t>Expand shortened URLs</a:t>
-            </a:r>
-          </a:p>
-          <a:p>
-            <a:pPr lvl="1"/>
-            <a:r>
-              <a:rPr lang="en-US"/>
-              <a:t>Own ‘suspicious’ list</a:t>
-            </a:r>
-          </a:p>
-          <a:p>
-            <a:r>
-              <a:rPr lang="en-US"/>
-              <a:t>Web page</a:t>
-            </a:r>
-          </a:p>
-          <a:p>
-            <a:pPr lvl="1"/>
-            <a:r>
-              <a:rPr lang="en-US"/>
-              <a:t>Title (NLP)</a:t>
-            </a:r>
-          </a:p>
-          <a:p>
-            <a:pPr lvl="1"/>
-            <a:r>
-              <a:rPr lang="en-US"/>
-              <a:t>Size / length</a:t>
-            </a:r>
-          </a:p>
-          <a:p>
-            <a:pPr lvl="1"/>
-            <a:r>
-              <a:rPr lang="en-US"/>
-              <a:t># of redirects to load</a:t>
-            </a:r>
-          </a:p>
-          <a:p>
-            <a:pPr lvl="1"/>
-            <a:r>
-              <a:rPr lang="en-US"/>
-              <a:t>DOM properties</a:t>
-            </a:r>
-          </a:p>
-          <a:p>
-            <a:pPr lvl="1"/>
-            <a:r>
-              <a:rPr lang="en-US"/>
-              <a:t>Page Rank / keyword analysis</a:t>
-            </a:r>
-          </a:p>
-          <a:p>
-            <a:pPr lvl="1"/>
-            <a:endParaRPr lang="en-US"/>
-          </a:p>
-        </p:txBody>
-      </p:sp>
-      <p:sp>
-        <p:nvSpPr>
-          <p:cNvPr id="4" name="Content Placeholder 3">
-            <a:extLst>
-              <a:ext uri="{FF2B5EF4-FFF2-40B4-BE49-F238E27FC236}">
-                <a16:creationId xmlns:a16="http://schemas.microsoft.com/office/drawing/2014/main" id="{0A158B60-DC8A-B24F-BDFA-084B8F392D5C}"/>
-              </a:ext>
-            </a:extLst>
-          </p:cNvPr>
-          <p:cNvSpPr>
-            <a:spLocks noGrp="1"/>
-          </p:cNvSpPr>
-          <p:nvPr>
-            <p:ph sz="half" idx="2"/>
-          </p:nvPr>
-        </p:nvSpPr>
-        <p:spPr>
-          <a:xfrm>
-            <a:off x="6313602" y="2075934"/>
-            <a:ext cx="4270247" cy="3991233"/>
-          </a:xfrm>
-        </p:spPr>
-        <p:txBody>
-          <a:bodyPr>
-            <a:normAutofit lnSpcReduction="10000"/>
-          </a:bodyPr>
-          <a:lstStyle/>
-          <a:p>
-            <a:r>
-              <a:rPr lang="en-US"/>
-              <a:t>Domain</a:t>
-            </a:r>
-          </a:p>
-          <a:p>
-            <a:pPr lvl="1"/>
-            <a:r>
-              <a:rPr lang="en-US"/>
-              <a:t>Length of time registered</a:t>
-            </a:r>
-          </a:p>
-          <a:p>
-            <a:pPr lvl="1"/>
-            <a:r>
-              <a:rPr lang="en-US"/>
-              <a:t>Registrant name hidden</a:t>
-            </a:r>
-          </a:p>
-          <a:p>
-            <a:r>
-              <a:rPr lang="en-US"/>
-              <a:t>Graph/linkage analysis</a:t>
-            </a:r>
-          </a:p>
-          <a:p>
-            <a:pPr lvl="1"/>
-            <a:r>
-              <a:rPr lang="en-US"/>
-              <a:t>Linkage to / from</a:t>
-            </a:r>
-          </a:p>
-          <a:p>
-            <a:pPr lvl="1"/>
-            <a:r>
-              <a:rPr lang="en-US"/>
-              <a:t># search results for domain</a:t>
-            </a:r>
-          </a:p>
-          <a:p>
-            <a:pPr lvl="1"/>
-            <a:endParaRPr lang="en-US"/>
-          </a:p>
-          <a:p>
-            <a:pPr lvl="1"/>
-            <a:endParaRPr lang="en-US"/>
-          </a:p>
-          <a:p>
-            <a:r>
-              <a:rPr lang="en-US"/>
-              <a:t>RESOURCES:</a:t>
-            </a:r>
-          </a:p>
-          <a:p>
-            <a:pPr lvl="1"/>
-            <a:r>
-              <a:rPr lang="en-US"/>
-              <a:t>ICANN (</a:t>
-            </a:r>
-            <a:r>
-              <a:rPr lang="en-US">
-                <a:hlinkClick r:id="rId3"/>
-              </a:rPr>
-              <a:t>https://lookup.icann.org/lookup</a:t>
-            </a:r>
-            <a:r>
-              <a:rPr lang="en-US"/>
-              <a:t>)</a:t>
-            </a:r>
-          </a:p>
-          <a:p>
-            <a:pPr lvl="1"/>
-            <a:r>
-              <a:rPr lang="en-US"/>
-              <a:t>WHOIS (</a:t>
-            </a:r>
-            <a:r>
-              <a:rPr lang="en-US">
-                <a:hlinkClick r:id="rId4"/>
-              </a:rPr>
-              <a:t>https://www.whois.net/</a:t>
-            </a:r>
-            <a:r>
-              <a:rPr lang="en-US"/>
-              <a:t>)</a:t>
-            </a:r>
-          </a:p>
-          <a:p>
-            <a:endParaRPr lang="en-US"/>
-          </a:p>
-        </p:txBody>
-      </p:sp>
-      <p:sp>
-        <p:nvSpPr>
-          <p:cNvPr id="7" name="Title 1">
-            <a:extLst>
-              <a:ext uri="{FF2B5EF4-FFF2-40B4-BE49-F238E27FC236}">
-                <a16:creationId xmlns:a16="http://schemas.microsoft.com/office/drawing/2014/main" id="{9F5234E5-66CA-FB40-B3E1-A7E5351E4DC5}"/>
-              </a:ext>
-            </a:extLst>
-          </p:cNvPr>
-          <p:cNvSpPr>
-            <a:spLocks noGrp="1"/>
-          </p:cNvSpPr>
-          <p:nvPr>
-            <p:ph type="title"/>
-          </p:nvPr>
-        </p:nvSpPr>
-        <p:spPr>
-          <a:xfrm>
-            <a:off x="2231136" y="501705"/>
-            <a:ext cx="7729728" cy="914400"/>
+            <a:off x="2286000" y="457200"/>
+            <a:ext cx="7772400" cy="914400"/>
           </a:xfrm>
         </p:spPr>
         <p:txBody>
@@ -5047,16 +5824,76 @@
           <a:lstStyle/>
           <a:p>
             <a:r>
-              <a:rPr lang="en-US"/>
-              <a:t>POTENTIAL ADDITIONAL FEATURES</a:t>
-            </a:r>
-          </a:p>
-        </p:txBody>
-      </p:sp>
+              <a:rPr lang="en-US" dirty="0"/>
+              <a:t>FEATURE IMPORTANCE</a:t>
+            </a:r>
+          </a:p>
+        </p:txBody>
+      </p:sp>
+      <p:pic>
+        <p:nvPicPr>
+          <p:cNvPr id="1027" name="Picture 3">
+            <a:extLst>
+              <a:ext uri="{FF2B5EF4-FFF2-40B4-BE49-F238E27FC236}">
+                <a16:creationId xmlns:a16="http://schemas.microsoft.com/office/drawing/2014/main" id="{B9087D19-6D6D-4A96-91AC-74BBAC3DD9AD}"/>
+              </a:ext>
+            </a:extLst>
+          </p:cNvPr>
+          <p:cNvPicPr>
+            <a:picLocks noChangeAspect="1" noChangeArrowheads="1"/>
+          </p:cNvPicPr>
+          <p:nvPr/>
+        </p:nvPicPr>
+        <p:blipFill>
+          <a:blip r:embed="rId3">
+            <a:extLst>
+              <a:ext uri="{28A0092B-C50C-407E-A947-70E740481C1C}">
+                <a14:useLocalDpi xmlns:a14="http://schemas.microsoft.com/office/drawing/2010/main" val="0"/>
+              </a:ext>
+            </a:extLst>
+          </a:blip>
+          <a:srcRect/>
+          <a:stretch>
+            <a:fillRect/>
+          </a:stretch>
+        </p:blipFill>
+        <p:spPr bwMode="auto">
+          <a:xfrm>
+            <a:off x="2303768" y="1758406"/>
+            <a:ext cx="7584464" cy="4041143"/>
+          </a:xfrm>
+          <a:prstGeom prst="rect">
+            <a:avLst/>
+          </a:prstGeom>
+          <a:noFill/>
+          <a:ln>
+            <a:noFill/>
+          </a:ln>
+          <a:extLst>
+            <a:ext uri="{909E8E84-426E-40DD-AFC4-6F175D3DCCD1}">
+              <a14:hiddenFill xmlns:a14="http://schemas.microsoft.com/office/drawing/2010/main">
+                <a:solidFill>
+                  <a:srgbClr val="FFFFFF"/>
+                </a:solidFill>
+              </a14:hiddenFill>
+            </a:ext>
+            <a:ext uri="{91240B29-F687-4F45-9708-019B960494DF}">
+              <a14:hiddenLine xmlns:a14="http://schemas.microsoft.com/office/drawing/2010/main" w="9525">
+                <a:solidFill>
+                  <a:srgbClr val="000000"/>
+                </a:solidFill>
+                <a:miter lim="800000"/>
+                <a:headEnd/>
+                <a:tailEnd/>
+              </a14:hiddenLine>
+            </a:ext>
+          </a:extLst>
+        </p:spPr>
+      </p:pic>
     </p:spTree>
     <p:extLst>
       <p:ext uri="{BB962C8B-B14F-4D97-AF65-F5344CB8AC3E}">
-        <p14:creationId xmlns:p14="http://schemas.microsoft.com/office/powerpoint/2010/main" val="638821798"/>
+        <p14:creationId xmlns:p14="http://schemas.microsoft.com/office/powerpoint/2010/main" val="1216451595"/>
       </p:ext>
     </p:extLst>
   </p:cSld>
@@ -5085,10 +5922,10 @@
       </p:grpSpPr>
       <p:sp>
         <p:nvSpPr>
-          <p:cNvPr id="2" name="Title 1">
+          <p:cNvPr id="3" name="Content Placeholder 2">
             <a:extLst>
               <a:ext uri="{FF2B5EF4-FFF2-40B4-BE49-F238E27FC236}">
-                <a16:creationId xmlns:a16="http://schemas.microsoft.com/office/drawing/2014/main" id="{8E5DDE81-5CA0-CB47-88AB-2ECA9B61D10C}"/>
+                <a16:creationId xmlns:a16="http://schemas.microsoft.com/office/drawing/2014/main" id="{43B626B8-0930-FD44-B7C4-848F2D2227B0}"/>
               </a:ext>
             </a:extLst>
           </p:cNvPr>
@@ -5096,57 +5933,77 @@
             <a:spLocks noGrp="1"/>
           </p:cNvSpPr>
           <p:nvPr>
-            <p:ph type="title"/>
-          </p:nvPr>
-        </p:nvSpPr>
-        <p:spPr/>
-        <p:txBody>
-          <a:bodyPr/>
+            <p:ph idx="1"/>
+          </p:nvPr>
+        </p:nvSpPr>
+        <p:spPr>
+          <a:xfrm>
+            <a:off x="2231136" y="1770928"/>
+            <a:ext cx="7729728" cy="3969100"/>
+          </a:xfrm>
+        </p:spPr>
+        <p:txBody>
+          <a:bodyPr>
+            <a:normAutofit/>
+          </a:bodyPr>
           <a:lstStyle/>
           <a:p>
             <a:r>
-              <a:rPr lang="en-US"/>
-              <a:t>Custom “suspicious” words</a:t>
-            </a:r>
-          </a:p>
-        </p:txBody>
-      </p:sp>
-      <p:pic>
-        <p:nvPicPr>
-          <p:cNvPr id="5" name="Content Placeholder 4">
+              <a:rPr lang="en-US" sz="2400" dirty="0"/>
+              <a:t>Better randomization of Benign URLs</a:t>
+            </a:r>
+          </a:p>
+          <a:p>
+            <a:r>
+              <a:rPr lang="en-US" sz="2400" dirty="0"/>
+              <a:t>Stack with Multinomial Naïve Bayes model fit on NLP features (Count of path “tokens”)</a:t>
+            </a:r>
+          </a:p>
+          <a:p>
+            <a:r>
+              <a:rPr lang="en-US" sz="2400" dirty="0"/>
+              <a:t>Additional Features</a:t>
+            </a:r>
+          </a:p>
+        </p:txBody>
+      </p:sp>
+      <p:sp>
+        <p:nvSpPr>
+          <p:cNvPr id="4" name="Title 1">
             <a:extLst>
               <a:ext uri="{FF2B5EF4-FFF2-40B4-BE49-F238E27FC236}">
-                <a16:creationId xmlns:a16="http://schemas.microsoft.com/office/drawing/2014/main" id="{6EEAE6CF-C760-114D-88D0-53A0A09BB4EA}"/>
+                <a16:creationId xmlns:a16="http://schemas.microsoft.com/office/drawing/2014/main" id="{98B9FD84-B092-4641-9A99-825B6EAA275B}"/>
               </a:ext>
             </a:extLst>
           </p:cNvPr>
-          <p:cNvPicPr>
-            <a:picLocks noGrp="1" noChangeAspect="1"/>
-          </p:cNvPicPr>
-          <p:nvPr>
-            <p:ph idx="1"/>
-          </p:nvPr>
-        </p:nvPicPr>
-        <p:blipFill>
-          <a:blip r:embed="rId2"/>
-          <a:stretch>
-            <a:fillRect/>
-          </a:stretch>
-        </p:blipFill>
+          <p:cNvSpPr>
+            <a:spLocks noGrp="1"/>
+          </p:cNvSpPr>
+          <p:nvPr>
+            <p:ph type="title"/>
+          </p:nvPr>
+        </p:nvSpPr>
         <p:spPr>
           <a:xfrm>
-            <a:off x="872375" y="2792577"/>
-            <a:ext cx="10447249" cy="1136871"/>
+            <a:off x="2286000" y="457200"/>
+            <a:ext cx="7772400" cy="914400"/>
           </a:xfrm>
-          <a:prstGeom prst="rect">
-            <a:avLst/>
-          </a:prstGeom>
         </p:spPr>
-      </p:pic>
+        <p:txBody>
+          <a:bodyPr/>
+          <a:lstStyle/>
+          <a:p>
+            <a:r>
+              <a:rPr lang="en-US"/>
+              <a:t>Future work</a:t>
+            </a:r>
+          </a:p>
+        </p:txBody>
+      </p:sp>
     </p:spTree>
     <p:extLst>
       <p:ext uri="{BB962C8B-B14F-4D97-AF65-F5344CB8AC3E}">
-        <p14:creationId xmlns:p14="http://schemas.microsoft.com/office/powerpoint/2010/main" val="4077622182"/>
+        <p14:creationId xmlns:p14="http://schemas.microsoft.com/office/powerpoint/2010/main" val="393610802"/>
       </p:ext>
     </p:extLst>
   </p:cSld>
@@ -5175,6 +6032,422 @@
       </p:grpSpPr>
       <p:sp>
         <p:nvSpPr>
+          <p:cNvPr id="3" name="Content Placeholder 2">
+            <a:extLst>
+              <a:ext uri="{FF2B5EF4-FFF2-40B4-BE49-F238E27FC236}">
+                <a16:creationId xmlns:a16="http://schemas.microsoft.com/office/drawing/2014/main" id="{CA683D1B-39FA-8147-A4DF-FA50DB03DEDD}"/>
+              </a:ext>
+            </a:extLst>
+          </p:cNvPr>
+          <p:cNvSpPr>
+            <a:spLocks noGrp="1"/>
+          </p:cNvSpPr>
+          <p:nvPr>
+            <p:ph sz="half" idx="1"/>
+          </p:nvPr>
+        </p:nvSpPr>
+        <p:spPr>
+          <a:xfrm>
+            <a:off x="1581912" y="2075935"/>
+            <a:ext cx="4271771" cy="3991233"/>
+          </a:xfrm>
+        </p:spPr>
+        <p:txBody>
+          <a:bodyPr>
+            <a:normAutofit lnSpcReduction="10000"/>
+          </a:bodyPr>
+          <a:lstStyle/>
+          <a:p>
+            <a:r>
+              <a:rPr lang="en-US"/>
+              <a:t>Additional URL-based features</a:t>
+            </a:r>
+          </a:p>
+          <a:p>
+            <a:pPr lvl="1"/>
+            <a:r>
+              <a:rPr lang="en-US"/>
+              <a:t>Levenshtein distance from English (other language?) word</a:t>
+            </a:r>
+          </a:p>
+          <a:p>
+            <a:pPr lvl="1"/>
+            <a:r>
+              <a:rPr lang="en-US"/>
+              <a:t>Expand shortened URLs</a:t>
+            </a:r>
+          </a:p>
+          <a:p>
+            <a:pPr lvl="1"/>
+            <a:r>
+              <a:rPr lang="en-US"/>
+              <a:t>Own ‘suspicious’ list</a:t>
+            </a:r>
+          </a:p>
+          <a:p>
+            <a:r>
+              <a:rPr lang="en-US"/>
+              <a:t>Web page</a:t>
+            </a:r>
+          </a:p>
+          <a:p>
+            <a:pPr lvl="1"/>
+            <a:r>
+              <a:rPr lang="en-US"/>
+              <a:t>Title (NLP)</a:t>
+            </a:r>
+          </a:p>
+          <a:p>
+            <a:pPr lvl="1"/>
+            <a:r>
+              <a:rPr lang="en-US"/>
+              <a:t>Size / length</a:t>
+            </a:r>
+          </a:p>
+          <a:p>
+            <a:pPr lvl="1"/>
+            <a:r>
+              <a:rPr lang="en-US"/>
+              <a:t># of redirects to load</a:t>
+            </a:r>
+          </a:p>
+          <a:p>
+            <a:pPr lvl="1"/>
+            <a:r>
+              <a:rPr lang="en-US"/>
+              <a:t>DOM properties</a:t>
+            </a:r>
+          </a:p>
+          <a:p>
+            <a:pPr lvl="1"/>
+            <a:r>
+              <a:rPr lang="en-US"/>
+              <a:t>Page Rank / keyword analysis</a:t>
+            </a:r>
+          </a:p>
+          <a:p>
+            <a:pPr lvl="1"/>
+            <a:endParaRPr lang="en-US"/>
+          </a:p>
+        </p:txBody>
+      </p:sp>
+      <p:sp>
+        <p:nvSpPr>
+          <p:cNvPr id="4" name="Content Placeholder 3">
+            <a:extLst>
+              <a:ext uri="{FF2B5EF4-FFF2-40B4-BE49-F238E27FC236}">
+                <a16:creationId xmlns:a16="http://schemas.microsoft.com/office/drawing/2014/main" id="{0A158B60-DC8A-B24F-BDFA-084B8F392D5C}"/>
+              </a:ext>
+            </a:extLst>
+          </p:cNvPr>
+          <p:cNvSpPr>
+            <a:spLocks noGrp="1"/>
+          </p:cNvSpPr>
+          <p:nvPr>
+            <p:ph sz="half" idx="2"/>
+          </p:nvPr>
+        </p:nvSpPr>
+        <p:spPr>
+          <a:xfrm>
+            <a:off x="6313602" y="2075934"/>
+            <a:ext cx="4270247" cy="3991233"/>
+          </a:xfrm>
+        </p:spPr>
+        <p:txBody>
+          <a:bodyPr>
+            <a:normAutofit lnSpcReduction="10000"/>
+          </a:bodyPr>
+          <a:lstStyle/>
+          <a:p>
+            <a:r>
+              <a:rPr lang="en-US"/>
+              <a:t>Domain</a:t>
+            </a:r>
+          </a:p>
+          <a:p>
+            <a:pPr lvl="1"/>
+            <a:r>
+              <a:rPr lang="en-US"/>
+              <a:t>Length of time registered</a:t>
+            </a:r>
+          </a:p>
+          <a:p>
+            <a:pPr lvl="1"/>
+            <a:r>
+              <a:rPr lang="en-US"/>
+              <a:t>Registrant name hidden</a:t>
+            </a:r>
+          </a:p>
+          <a:p>
+            <a:r>
+              <a:rPr lang="en-US"/>
+              <a:t>Graph/linkage analysis</a:t>
+            </a:r>
+          </a:p>
+          <a:p>
+            <a:pPr lvl="1"/>
+            <a:r>
+              <a:rPr lang="en-US"/>
+              <a:t>Linkage to / from</a:t>
+            </a:r>
+          </a:p>
+          <a:p>
+            <a:pPr lvl="1"/>
+            <a:r>
+              <a:rPr lang="en-US"/>
+              <a:t># search results for domain</a:t>
+            </a:r>
+          </a:p>
+          <a:p>
+            <a:pPr lvl="1"/>
+            <a:endParaRPr lang="en-US"/>
+          </a:p>
+          <a:p>
+            <a:pPr lvl="1"/>
+            <a:endParaRPr lang="en-US"/>
+          </a:p>
+          <a:p>
+            <a:r>
+              <a:rPr lang="en-US"/>
+              <a:t>RESOURCES:</a:t>
+            </a:r>
+          </a:p>
+          <a:p>
+            <a:pPr lvl="1"/>
+            <a:r>
+              <a:rPr lang="en-US"/>
+              <a:t>ICANN (</a:t>
+            </a:r>
+            <a:r>
+              <a:rPr lang="en-US">
+                <a:hlinkClick r:id="rId3"/>
+              </a:rPr>
+              <a:t>https://lookup.icann.org/lookup</a:t>
+            </a:r>
+            <a:r>
+              <a:rPr lang="en-US"/>
+              <a:t>)</a:t>
+            </a:r>
+          </a:p>
+          <a:p>
+            <a:pPr lvl="1"/>
+            <a:r>
+              <a:rPr lang="en-US"/>
+              <a:t>WHOIS (</a:t>
+            </a:r>
+            <a:r>
+              <a:rPr lang="en-US">
+                <a:hlinkClick r:id="rId4"/>
+              </a:rPr>
+              <a:t>https://www.whois.net/</a:t>
+            </a:r>
+            <a:r>
+              <a:rPr lang="en-US"/>
+              <a:t>)</a:t>
+            </a:r>
+          </a:p>
+          <a:p>
+            <a:endParaRPr lang="en-US"/>
+          </a:p>
+        </p:txBody>
+      </p:sp>
+      <p:sp>
+        <p:nvSpPr>
+          <p:cNvPr id="7" name="Title 1">
+            <a:extLst>
+              <a:ext uri="{FF2B5EF4-FFF2-40B4-BE49-F238E27FC236}">
+                <a16:creationId xmlns:a16="http://schemas.microsoft.com/office/drawing/2014/main" id="{9F5234E5-66CA-FB40-B3E1-A7E5351E4DC5}"/>
+              </a:ext>
+            </a:extLst>
+          </p:cNvPr>
+          <p:cNvSpPr>
+            <a:spLocks noGrp="1"/>
+          </p:cNvSpPr>
+          <p:nvPr>
+            <p:ph type="title"/>
+          </p:nvPr>
+        </p:nvSpPr>
+        <p:spPr>
+          <a:xfrm>
+            <a:off x="2286000" y="457200"/>
+            <a:ext cx="7772400" cy="914400"/>
+          </a:xfrm>
+        </p:spPr>
+        <p:txBody>
+          <a:bodyPr>
+            <a:normAutofit/>
+          </a:bodyPr>
+          <a:lstStyle/>
+          <a:p>
+            <a:r>
+              <a:rPr lang="en-US"/>
+              <a:t>POTENTIAL ADDITIONAL FEATURES</a:t>
+            </a:r>
+          </a:p>
+        </p:txBody>
+      </p:sp>
+    </p:spTree>
+    <p:extLst>
+      <p:ext uri="{BB962C8B-B14F-4D97-AF65-F5344CB8AC3E}">
+        <p14:creationId xmlns:p14="http://schemas.microsoft.com/office/powerpoint/2010/main" val="638821798"/>
+      </p:ext>
+    </p:extLst>
+  </p:cSld>
+  <p:clrMapOvr>
+    <a:masterClrMapping/>
+  </p:clrMapOvr>
+</p:sld>
+</file>
+
+<file path=ppt/slides/slide15.xml><?xml version="1.0" encoding="utf-8"?>
+<p:sld xmlns:a="http://schemas.openxmlformats.org/drawingml/2006/main" xmlns:r="http://schemas.openxmlformats.org/officeDocument/2006/relationships" xmlns:p="http://schemas.openxmlformats.org/presentationml/2006/main">
+  <p:cSld>
+    <p:spTree>
+      <p:nvGrpSpPr>
+        <p:cNvPr id="1" name=""/>
+        <p:cNvGrpSpPr/>
+        <p:nvPr/>
+      </p:nvGrpSpPr>
+      <p:grpSpPr>
+        <a:xfrm>
+          <a:off x="0" y="0"/>
+          <a:ext cx="0" cy="0"/>
+          <a:chOff x="0" y="0"/>
+          <a:chExt cx="0" cy="0"/>
+        </a:xfrm>
+      </p:grpSpPr>
+      <p:sp>
+        <p:nvSpPr>
+          <p:cNvPr id="2" name="Title 1">
+            <a:extLst>
+              <a:ext uri="{FF2B5EF4-FFF2-40B4-BE49-F238E27FC236}">
+                <a16:creationId xmlns:a16="http://schemas.microsoft.com/office/drawing/2014/main" id="{8E5DDE81-5CA0-CB47-88AB-2ECA9B61D10C}"/>
+              </a:ext>
+            </a:extLst>
+          </p:cNvPr>
+          <p:cNvSpPr>
+            <a:spLocks noGrp="1"/>
+          </p:cNvSpPr>
+          <p:nvPr>
+            <p:ph type="title"/>
+          </p:nvPr>
+        </p:nvSpPr>
+        <p:spPr>
+          <a:xfrm>
+            <a:off x="2286000" y="457200"/>
+            <a:ext cx="7772400" cy="914400"/>
+          </a:xfrm>
+        </p:spPr>
+        <p:txBody>
+          <a:bodyPr/>
+          <a:lstStyle/>
+          <a:p>
+            <a:r>
+              <a:rPr lang="en-US"/>
+              <a:t>Custom “suspicious” words</a:t>
+            </a:r>
+          </a:p>
+        </p:txBody>
+      </p:sp>
+      <p:pic>
+        <p:nvPicPr>
+          <p:cNvPr id="5" name="Content Placeholder 4">
+            <a:extLst>
+              <a:ext uri="{FF2B5EF4-FFF2-40B4-BE49-F238E27FC236}">
+                <a16:creationId xmlns:a16="http://schemas.microsoft.com/office/drawing/2014/main" id="{6EEAE6CF-C760-114D-88D0-53A0A09BB4EA}"/>
+              </a:ext>
+            </a:extLst>
+          </p:cNvPr>
+          <p:cNvPicPr>
+            <a:picLocks noGrp="1" noChangeAspect="1"/>
+          </p:cNvPicPr>
+          <p:nvPr>
+            <p:ph idx="1"/>
+          </p:nvPr>
+        </p:nvPicPr>
+        <p:blipFill>
+          <a:blip r:embed="rId2"/>
+          <a:stretch>
+            <a:fillRect/>
+          </a:stretch>
+        </p:blipFill>
+        <p:spPr>
+          <a:xfrm>
+            <a:off x="872375" y="2697132"/>
+            <a:ext cx="10447249" cy="1136871"/>
+          </a:xfrm>
+          <a:prstGeom prst="rect">
+            <a:avLst/>
+          </a:prstGeom>
+        </p:spPr>
+      </p:pic>
+      <p:sp>
+        <p:nvSpPr>
+          <p:cNvPr id="3" name="TextBox 2">
+            <a:extLst>
+              <a:ext uri="{FF2B5EF4-FFF2-40B4-BE49-F238E27FC236}">
+                <a16:creationId xmlns:a16="http://schemas.microsoft.com/office/drawing/2014/main" id="{36195225-15CD-4504-816D-CA34A24304A1}"/>
+              </a:ext>
+            </a:extLst>
+          </p:cNvPr>
+          <p:cNvSpPr txBox="1"/>
+          <p:nvPr/>
+        </p:nvSpPr>
+        <p:spPr>
+          <a:xfrm>
+            <a:off x="2286000" y="1816274"/>
+            <a:ext cx="3487045" cy="369332"/>
+          </a:xfrm>
+          <a:prstGeom prst="rect">
+            <a:avLst/>
+          </a:prstGeom>
+          <a:noFill/>
+        </p:spPr>
+        <p:txBody>
+          <a:bodyPr wrap="none" rtlCol="0">
+            <a:spAutoFit/>
+          </a:bodyPr>
+          <a:lstStyle/>
+          <a:p>
+            <a:r>
+              <a:rPr lang="en-US" dirty="0"/>
+              <a:t>From TF-IDF vectorization of URL</a:t>
+            </a:r>
+          </a:p>
+        </p:txBody>
+      </p:sp>
+    </p:spTree>
+    <p:extLst>
+      <p:ext uri="{BB962C8B-B14F-4D97-AF65-F5344CB8AC3E}">
+        <p14:creationId xmlns:p14="http://schemas.microsoft.com/office/powerpoint/2010/main" val="4077622182"/>
+      </p:ext>
+    </p:extLst>
+  </p:cSld>
+  <p:clrMapOvr>
+    <a:masterClrMapping/>
+  </p:clrMapOvr>
+</p:sld>
+</file>
+
+<file path=ppt/slides/slide16.xml><?xml version="1.0" encoding="utf-8"?>
+<p:sld xmlns:a="http://schemas.openxmlformats.org/drawingml/2006/main" xmlns:r="http://schemas.openxmlformats.org/officeDocument/2006/relationships" xmlns:p="http://schemas.openxmlformats.org/presentationml/2006/main">
+  <p:cSld>
+    <p:spTree>
+      <p:nvGrpSpPr>
+        <p:cNvPr id="1" name=""/>
+        <p:cNvGrpSpPr/>
+        <p:nvPr/>
+      </p:nvGrpSpPr>
+      <p:grpSpPr>
+        <a:xfrm>
+          <a:off x="0" y="0"/>
+          <a:ext cx="0" cy="0"/>
+          <a:chOff x="0" y="0"/>
+          <a:chExt cx="0" cy="0"/>
+        </a:xfrm>
+      </p:grpSpPr>
+      <p:sp>
+        <p:nvSpPr>
           <p:cNvPr id="2" name="Title 1">
             <a:extLst>
               <a:ext uri="{FF2B5EF4-FFF2-40B4-BE49-F238E27FC236}">
@@ -5195,7 +6468,7 @@
           <a:lstStyle/>
           <a:p>
             <a:r>
-              <a:rPr lang="en-US"/>
+              <a:rPr lang="en-US" dirty="0"/>
               <a:t>REFERENCES</a:t>
             </a:r>
           </a:p>
@@ -5273,7 +6546,73 @@
 </p:sld>
 </file>
 
-<file path=ppt/slides/slide15.xml><?xml version="1.0" encoding="utf-8"?>
+<file path=ppt/slides/slide17.xml><?xml version="1.0" encoding="utf-8"?>
+<p:sld xmlns:a="http://schemas.openxmlformats.org/drawingml/2006/main" xmlns:r="http://schemas.openxmlformats.org/officeDocument/2006/relationships" xmlns:p="http://schemas.openxmlformats.org/presentationml/2006/main">
+  <p:cSld>
+    <p:bg>
+      <p:bgPr>
+        <a:solidFill>
+          <a:schemeClr val="accent2"/>
+        </a:solidFill>
+        <a:effectLst/>
+      </p:bgPr>
+    </p:bg>
+    <p:spTree>
+      <p:nvGrpSpPr>
+        <p:cNvPr id="1" name=""/>
+        <p:cNvGrpSpPr/>
+        <p:nvPr/>
+      </p:nvGrpSpPr>
+      <p:grpSpPr>
+        <a:xfrm>
+          <a:off x="0" y="0"/>
+          <a:ext cx="0" cy="0"/>
+          <a:chOff x="0" y="0"/>
+          <a:chExt cx="0" cy="0"/>
+        </a:xfrm>
+      </p:grpSpPr>
+      <p:sp>
+        <p:nvSpPr>
+          <p:cNvPr id="4" name="Title 3">
+            <a:extLst>
+              <a:ext uri="{FF2B5EF4-FFF2-40B4-BE49-F238E27FC236}">
+                <a16:creationId xmlns:a16="http://schemas.microsoft.com/office/drawing/2014/main" id="{5C0CD122-E347-4361-AE07-E7011642E845}"/>
+              </a:ext>
+            </a:extLst>
+          </p:cNvPr>
+          <p:cNvSpPr>
+            <a:spLocks noGrp="1"/>
+          </p:cNvSpPr>
+          <p:nvPr>
+            <p:ph type="ctrTitle"/>
+          </p:nvPr>
+        </p:nvSpPr>
+        <p:spPr/>
+        <p:txBody>
+          <a:bodyPr/>
+          <a:lstStyle/>
+          <a:p>
+            <a:r>
+              <a:rPr lang="en-US" dirty="0"/>
+              <a:t>Thank you</a:t>
+            </a:r>
+          </a:p>
+        </p:txBody>
+      </p:sp>
+    </p:spTree>
+    <p:extLst>
+      <p:ext uri="{BB962C8B-B14F-4D97-AF65-F5344CB8AC3E}">
+        <p14:creationId xmlns:p14="http://schemas.microsoft.com/office/powerpoint/2010/main" val="2805601405"/>
+      </p:ext>
+    </p:extLst>
+  </p:cSld>
+  <p:clrMapOvr>
+    <a:masterClrMapping/>
+  </p:clrMapOvr>
+</p:sld>
+</file>
+
+<file path=ppt/slides/slide18.xml><?xml version="1.0" encoding="utf-8"?>
 <p:sld xmlns:a="http://schemas.openxmlformats.org/drawingml/2006/main" xmlns:r="http://schemas.openxmlformats.org/officeDocument/2006/relationships" xmlns:p="http://schemas.openxmlformats.org/presentationml/2006/main">
   <p:cSld>
     <p:spTree>
@@ -5320,6 +6659,41 @@
           </a:prstGeom>
         </p:spPr>
       </p:pic>
+      <p:sp>
+        <p:nvSpPr>
+          <p:cNvPr id="3" name="TextBox 2">
+            <a:extLst>
+              <a:ext uri="{FF2B5EF4-FFF2-40B4-BE49-F238E27FC236}">
+                <a16:creationId xmlns:a16="http://schemas.microsoft.com/office/drawing/2014/main" id="{EEAA9D4C-D850-4EC6-A063-E40212C85C98}"/>
+              </a:ext>
+            </a:extLst>
+          </p:cNvPr>
+          <p:cNvSpPr txBox="1"/>
+          <p:nvPr/>
+        </p:nvSpPr>
+        <p:spPr>
+          <a:xfrm>
+            <a:off x="2984360" y="693336"/>
+            <a:ext cx="3262175" cy="369332"/>
+          </a:xfrm>
+          <a:prstGeom prst="rect">
+            <a:avLst/>
+          </a:prstGeom>
+          <a:noFill/>
+        </p:spPr>
+        <p:txBody>
+          <a:bodyPr wrap="none" rtlCol="0">
+            <a:spAutoFit/>
+          </a:bodyPr>
+          <a:lstStyle/>
+          <a:p>
+            <a:r>
+              <a:rPr lang="en-US" dirty="0"/>
+              <a:t>Full evaluation metrics of models</a:t>
+            </a:r>
+          </a:p>
+        </p:txBody>
+      </p:sp>
     </p:spTree>
     <p:extLst>
       <p:ext uri="{BB962C8B-B14F-4D97-AF65-F5344CB8AC3E}">
@@ -5333,7 +6707,7 @@
 </p:sld>
 </file>
 
-<file path=ppt/slides/slide16.xml><?xml version="1.0" encoding="utf-8"?>
+<file path=ppt/slides/slide19.xml><?xml version="1.0" encoding="utf-8"?>
 <p:sld xmlns:a="http://schemas.openxmlformats.org/drawingml/2006/main" xmlns:r="http://schemas.openxmlformats.org/officeDocument/2006/relationships" xmlns:p="http://schemas.openxmlformats.org/presentationml/2006/main">
   <p:cSld>
     <p:spTree>
@@ -6087,6 +7461,41 @@
           </a:p>
         </p:txBody>
       </p:sp>
+      <p:sp>
+        <p:nvSpPr>
+          <p:cNvPr id="4" name="TextBox 3">
+            <a:extLst>
+              <a:ext uri="{FF2B5EF4-FFF2-40B4-BE49-F238E27FC236}">
+                <a16:creationId xmlns:a16="http://schemas.microsoft.com/office/drawing/2014/main" id="{027C6303-5225-4EC2-BB0B-E9A4C08CE967}"/>
+              </a:ext>
+            </a:extLst>
+          </p:cNvPr>
+          <p:cNvSpPr txBox="1"/>
+          <p:nvPr/>
+        </p:nvSpPr>
+        <p:spPr>
+          <a:xfrm>
+            <a:off x="5056997" y="1394049"/>
+            <a:ext cx="2078005" cy="369332"/>
+          </a:xfrm>
+          <a:prstGeom prst="rect">
+            <a:avLst/>
+          </a:prstGeom>
+          <a:noFill/>
+        </p:spPr>
+        <p:txBody>
+          <a:bodyPr wrap="none" rtlCol="0">
+            <a:spAutoFit/>
+          </a:bodyPr>
+          <a:lstStyle/>
+          <a:p>
+            <a:r>
+              <a:rPr lang="en-US" dirty="0"/>
+              <a:t>At threshold of 0.50</a:t>
+            </a:r>
+          </a:p>
+        </p:txBody>
+      </p:sp>
     </p:spTree>
     <p:extLst>
       <p:ext uri="{BB962C8B-B14F-4D97-AF65-F5344CB8AC3E}">
@@ -6135,8 +7544,8 @@
         </p:nvSpPr>
         <p:spPr>
           <a:xfrm>
-            <a:off x="2286001" y="457200"/>
-            <a:ext cx="7726679" cy="914400"/>
+            <a:off x="2286000" y="457200"/>
+            <a:ext cx="7772400" cy="914400"/>
           </a:xfrm>
         </p:spPr>
         <p:txBody>
@@ -6254,7 +7663,12 @@
             <p:ph type="title"/>
           </p:nvPr>
         </p:nvSpPr>
-        <p:spPr/>
+        <p:spPr>
+          <a:xfrm>
+            <a:off x="2286000" y="457200"/>
+            <a:ext cx="7772400" cy="914400"/>
+          </a:xfrm>
+        </p:spPr>
         <p:txBody>
           <a:bodyPr/>
           <a:lstStyle/>
@@ -6282,7 +7696,12 @@
             <p:ph idx="1"/>
           </p:nvPr>
         </p:nvSpPr>
-        <p:spPr/>
+        <p:spPr>
+          <a:xfrm>
+            <a:off x="2231136" y="1878008"/>
+            <a:ext cx="7729728" cy="3101983"/>
+          </a:xfrm>
+        </p:spPr>
         <p:txBody>
           <a:bodyPr>
             <a:noAutofit/>
@@ -6290,24 +7709,24 @@
           <a:lstStyle/>
           <a:p>
             <a:r>
-              <a:rPr lang="en-US"/>
+              <a:rPr lang="en-US" dirty="0"/>
               <a:t>Phishing URLs:</a:t>
             </a:r>
           </a:p>
           <a:p>
             <a:pPr lvl="1"/>
             <a:r>
-              <a:rPr lang="en-US"/>
+              <a:rPr lang="en-US" dirty="0"/>
               <a:t>Supplied site (</a:t>
             </a:r>
             <a:r>
-              <a:rPr lang="en-US" u="sng">
+              <a:rPr lang="en-US" u="sng" dirty="0">
                 <a:hlinkClick r:id="rId2"/>
               </a:rPr>
               <a:t>https://openphish.com/feed.txt</a:t>
             </a:r>
             <a:r>
-              <a:rPr lang="en-US">
+              <a:rPr lang="en-US" dirty="0">
                 <a:effectLst/>
               </a:rPr>
               <a:t> )</a:t>
@@ -6316,71 +7735,87 @@
           <a:p>
             <a:pPr lvl="1"/>
             <a:r>
-              <a:rPr lang="en-US"/>
+              <a:rPr lang="en-US" dirty="0"/>
               <a:t>Additional source (</a:t>
             </a:r>
             <a:r>
-              <a:rPr lang="en-US">
+              <a:rPr lang="en-US" dirty="0">
                 <a:hlinkClick r:id="rId3"/>
               </a:rPr>
               <a:t>https://www.phishtank.com/</a:t>
             </a:r>
             <a:r>
-              <a:rPr lang="en-US"/>
+              <a:rPr lang="en-US" dirty="0"/>
               <a:t>)</a:t>
             </a:r>
           </a:p>
           <a:p>
             <a:pPr lvl="1"/>
             <a:r>
-              <a:rPr lang="en-US"/>
+              <a:rPr lang="en-US" dirty="0"/>
               <a:t>Total: 11,339 URLs </a:t>
             </a:r>
           </a:p>
           <a:p>
             <a:r>
-              <a:rPr lang="en-US"/>
+              <a:rPr lang="en-US" dirty="0"/>
               <a:t>“Benign” URLs:</a:t>
             </a:r>
           </a:p>
           <a:p>
             <a:pPr lvl="1"/>
             <a:r>
-              <a:rPr lang="en-US"/>
-              <a:t>Chose one cc_index file at random from Nov 2019 index </a:t>
+              <a:rPr lang="en-US" dirty="0"/>
+              <a:t>Chose one </a:t>
+            </a:r>
+            <a:r>
+              <a:rPr lang="en-US" dirty="0" err="1"/>
+              <a:t>cc_index</a:t>
+            </a:r>
+            <a:r>
+              <a:rPr lang="en-US" dirty="0"/>
+              <a:t> file at random from Nov 2019 index </a:t>
             </a:r>
           </a:p>
           <a:p>
             <a:pPr lvl="2"/>
             <a:r>
-              <a:rPr lang="en-US"/>
+              <a:rPr lang="en-US" dirty="0"/>
               <a:t>&gt;300 total in month</a:t>
             </a:r>
           </a:p>
           <a:p>
             <a:pPr lvl="2"/>
             <a:r>
-              <a:rPr lang="en-US"/>
+              <a:rPr lang="en-US" dirty="0"/>
               <a:t>Each file contains 7-10 million URLs</a:t>
             </a:r>
           </a:p>
           <a:p>
             <a:pPr lvl="1"/>
             <a:r>
-              <a:rPr lang="en-US"/>
+              <a:rPr lang="en-US" dirty="0"/>
               <a:t>This was still not randomized enough! (more later)</a:t>
             </a:r>
           </a:p>
           <a:p>
             <a:r>
-              <a:rPr lang="en-US"/>
-              <a:t>Rate of Phising URLs:</a:t>
+              <a:rPr lang="en-US" dirty="0"/>
+              <a:t>Rate of </a:t>
+            </a:r>
+            <a:r>
+              <a:rPr lang="en-US" dirty="0" err="1"/>
+              <a:t>Phising</a:t>
+            </a:r>
+            <a:r>
+              <a:rPr lang="en-US" dirty="0"/>
+              <a:t> URLs:</a:t>
             </a:r>
           </a:p>
           <a:p>
             <a:pPr lvl="1"/>
             <a:r>
-              <a:rPr lang="en-US"/>
+              <a:rPr lang="en-US" dirty="0"/>
               <a:t>Literature</a:t>
             </a:r>
           </a:p>
@@ -6432,7 +7867,12 @@
             <p:ph type="title"/>
           </p:nvPr>
         </p:nvSpPr>
-        <p:spPr/>
+        <p:spPr>
+          <a:xfrm>
+            <a:off x="2286000" y="457200"/>
+            <a:ext cx="7772400" cy="914400"/>
+          </a:xfrm>
+        </p:spPr>
         <p:txBody>
           <a:bodyPr/>
           <a:lstStyle/>
@@ -6462,8 +7902,8 @@
         </p:nvSpPr>
         <p:spPr>
           <a:xfrm>
-            <a:off x="2231136" y="2638044"/>
-            <a:ext cx="7729728" cy="3335373"/>
+            <a:off x="2231136" y="1761313"/>
+            <a:ext cx="7729728" cy="4076779"/>
           </a:xfrm>
         </p:spPr>
         <p:txBody>
@@ -6473,58 +7913,93 @@
           <a:lstStyle/>
           <a:p>
             <a:r>
-              <a:rPr lang="en-US"/>
+              <a:rPr lang="en-US" dirty="0"/>
               <a:t>Given time constraints, decided to restrict features to those contained within URL string</a:t>
             </a:r>
           </a:p>
           <a:p>
             <a:pPr lvl="1"/>
             <a:r>
-              <a:rPr lang="en-US"/>
+              <a:rPr lang="en-US" dirty="0"/>
               <a:t>Length of URL</a:t>
             </a:r>
           </a:p>
           <a:p>
             <a:pPr lvl="1"/>
             <a:r>
-              <a:rPr lang="en-US"/>
-              <a:t>Number of “special” characters (/ . ), digits</a:t>
+              <a:rPr lang="en-US" dirty="0"/>
+              <a:t>Number of “special” characters ($ - _ . + ! * ’(</a:t>
+            </a:r>
+            <a:r>
+              <a:rPr lang="en-US" b="1" dirty="0"/>
+              <a:t> </a:t>
+            </a:r>
+            <a:r>
+              <a:rPr lang="en-US" dirty="0"/>
+              <a:t>) </a:t>
+            </a:r>
+            <a:r>
+              <a:rPr lang="en-US" b="1" dirty="0"/>
+              <a:t>,</a:t>
+            </a:r>
+            <a:r>
+              <a:rPr lang="en-US" dirty="0"/>
+              <a:t> )</a:t>
             </a:r>
           </a:p>
           <a:p>
             <a:pPr lvl="1"/>
             <a:r>
-              <a:rPr lang="en-US"/>
-              <a:t>Unicode characters (HEX encoding)</a:t>
+              <a:rPr lang="en-US" dirty="0"/>
+              <a:t>Number of digits, dots, slashes</a:t>
             </a:r>
           </a:p>
           <a:p>
             <a:pPr lvl="1"/>
             <a:r>
-              <a:rPr lang="en-US"/>
+              <a:rPr lang="en-US" dirty="0"/>
+              <a:t>HEX encoding (%XX) present</a:t>
+            </a:r>
+          </a:p>
+          <a:p>
+            <a:pPr lvl="1"/>
+            <a:r>
+              <a:rPr lang="en-US" dirty="0"/>
               <a:t>HTTP or HTTPS</a:t>
             </a:r>
           </a:p>
           <a:p>
             <a:pPr lvl="1"/>
             <a:r>
-              <a:rPr lang="en-US"/>
-              <a:t>Top-level-domain*</a:t>
+              <a:rPr lang="en-US" dirty="0"/>
+              <a:t>Top-level-domain</a:t>
             </a:r>
           </a:p>
           <a:p>
             <a:pPr lvl="1"/>
             <a:r>
-              <a:rPr lang="en-US"/>
+              <a:rPr lang="en-US" dirty="0"/>
               <a:t>Subdomain = www or is null</a:t>
             </a:r>
           </a:p>
           <a:p>
             <a:pPr lvl="1"/>
             <a:r>
-              <a:rPr lang="en-US"/>
-              <a:t>“Supicious” words in URL (php, abuse, verification)</a:t>
-            </a:r>
+              <a:rPr lang="en-US" dirty="0"/>
+              <a:t>“Suspicious” words in URL (php, abuse, admin, verification)</a:t>
+            </a:r>
+          </a:p>
+          <a:p>
+            <a:pPr lvl="1"/>
+            <a:r>
+              <a:rPr lang="en-US" dirty="0"/>
+              <a:t>Entropy of hostname, </a:t>
+            </a:r>
+            <a:r>
+              <a:rPr lang="en-US" dirty="0" err="1"/>
+              <a:t>url</a:t>
+            </a:r>
+            <a:endParaRPr lang="en-US" dirty="0"/>
           </a:p>
         </p:txBody>
       </p:sp>
@@ -6576,8 +8051,8 @@
         </p:nvSpPr>
         <p:spPr>
           <a:xfrm>
-            <a:off x="2231136" y="385958"/>
-            <a:ext cx="7729728" cy="1188720"/>
+            <a:off x="2286000" y="457200"/>
+            <a:ext cx="7772400" cy="914400"/>
           </a:xfrm>
         </p:spPr>
         <p:txBody>
@@ -6735,8 +8210,8 @@
         </p:nvSpPr>
         <p:spPr>
           <a:xfrm>
-            <a:off x="2231135" y="517431"/>
-            <a:ext cx="7729728" cy="1188720"/>
+            <a:off x="2286000" y="457200"/>
+            <a:ext cx="7772400" cy="914400"/>
           </a:xfrm>
         </p:spPr>
         <p:txBody>
@@ -6903,8 +8378,8 @@
         </p:nvSpPr>
         <p:spPr>
           <a:xfrm>
-            <a:off x="2231136" y="532206"/>
-            <a:ext cx="7729728" cy="1188720"/>
+            <a:off x="2286000" y="457200"/>
+            <a:ext cx="7772400" cy="914400"/>
           </a:xfrm>
         </p:spPr>
         <p:txBody>
@@ -7143,17 +8618,21 @@
           <a:lstStyle/>
           <a:p>
             <a:r>
-              <a:rPr lang="en-US"/>
-              <a:t>CommonCrawl Index files appear to be alphabetically ordered by top-level domain (suffix), then domain name.</a:t>
-            </a:r>
-          </a:p>
-          <a:p>
-            <a:endParaRPr lang="en-US"/>
-          </a:p>
-          <a:p>
-            <a:r>
-              <a:rPr lang="en-US"/>
-              <a:t>I chose 144 (out of 302), which is .com &amp; domain names starting with ‘c’.</a:t>
+              <a:rPr lang="en-US" dirty="0" err="1"/>
+              <a:t>CommonCrawl</a:t>
+            </a:r>
+            <a:r>
+              <a:rPr lang="en-US" dirty="0"/>
+              <a:t> Index files appear to be alphabetically ordered by top-level domain (suffix), then domain name.</a:t>
+            </a:r>
+          </a:p>
+          <a:p>
+            <a:endParaRPr lang="en-US" dirty="0"/>
+          </a:p>
+          <a:p>
+            <a:r>
+              <a:rPr lang="en-US" dirty="0"/>
+              <a:t>I chose file # 144 (out of 302), which is .com TLDs &amp; domain names starting with ‘c’.</a:t>
             </a:r>
           </a:p>
         </p:txBody>
@@ -7206,8 +8685,8 @@
         </p:nvSpPr>
         <p:spPr>
           <a:xfrm>
-            <a:off x="2231136" y="482777"/>
-            <a:ext cx="7729728" cy="1188720"/>
+            <a:off x="2286000" y="457200"/>
+            <a:ext cx="7772400" cy="914400"/>
           </a:xfrm>
         </p:spPr>
         <p:txBody>
@@ -7236,13 +8715,13 @@
           <p:nvPr>
             <p:extLst>
               <p:ext uri="{D42A27DB-BD31-4B8C-83A1-F6EECF244321}">
-                <p14:modId xmlns:p14="http://schemas.microsoft.com/office/powerpoint/2010/main" val="3163905988"/>
+                <p14:modId xmlns:p14="http://schemas.microsoft.com/office/powerpoint/2010/main" val="3510182171"/>
               </p:ext>
             </p:extLst>
           </p:nvPr>
         </p:nvGraphicFramePr>
         <p:xfrm>
-          <a:off x="1696554" y="2183136"/>
+          <a:off x="2012612" y="1831444"/>
           <a:ext cx="8166775" cy="2397760"/>
         </p:xfrm>
         <a:graphic>
@@ -7311,7 +8790,7 @@
                     <a:lstStyle/>
                     <a:p>
                       <a:r>
-                        <a:rPr lang="en-US">
+                        <a:rPr lang="en-US" dirty="0">
                           <a:latin typeface="Courier New" panose="02070309020205020404" pitchFamily="49" charset="0"/>
                           <a:cs typeface="Courier New" panose="02070309020205020404" pitchFamily="49" charset="0"/>
                         </a:rPr>
@@ -7750,7 +9229,7 @@
                         <a:defRPr/>
                       </a:pPr>
                       <a:r>
-                        <a:rPr lang="en-US">
+                        <a:rPr lang="en-US" dirty="0">
                           <a:latin typeface="Courier New" panose="02070309020205020404" pitchFamily="49" charset="0"/>
                           <a:cs typeface="Courier New" panose="02070309020205020404" pitchFamily="49" charset="0"/>
                         </a:rPr>
@@ -7784,8 +9263,8 @@
         </p:nvSpPr>
         <p:spPr>
           <a:xfrm>
-            <a:off x="2927889" y="5189056"/>
-            <a:ext cx="6682470" cy="1754326"/>
+            <a:off x="2927889" y="4767025"/>
+            <a:ext cx="6682470" cy="1200329"/>
           </a:xfrm>
           <a:prstGeom prst="rect">
             <a:avLst/>
@@ -7802,7 +9281,7 @@
               <a:buAutoNum type="arabicParenBoth"/>
             </a:pPr>
             <a:r>
-              <a:rPr lang="en-US"/>
+              <a:rPr lang="en-US" dirty="0"/>
               <a:t>Average of 5-fold cross-validation on subset (20%) of training data</a:t>
             </a:r>
           </a:p>
@@ -7811,7 +9290,7 @@
               <a:buAutoNum type="arabicParenBoth"/>
             </a:pPr>
             <a:r>
-              <a:rPr lang="en-US"/>
+              <a:rPr lang="en-US" dirty="0"/>
               <a:t>Did not converge</a:t>
             </a:r>
           </a:p>
@@ -7820,9 +9299,18 @@
               <a:buAutoNum type="arabicParenBoth"/>
             </a:pPr>
             <a:r>
-              <a:rPr lang="en-US"/>
-              <a:t>n_estimators = 100, no limit on max depth, criterion = gini</a:t>
-            </a:r>
+              <a:rPr lang="en-US" dirty="0" err="1"/>
+              <a:t>n_estimators</a:t>
+            </a:r>
+            <a:r>
+              <a:rPr lang="en-US" dirty="0"/>
+              <a:t> = 100, no limit on max depth, criterion = </a:t>
+            </a:r>
+            <a:r>
+              <a:rPr lang="en-US" dirty="0" err="1"/>
+              <a:t>gini</a:t>
+            </a:r>
+            <a:endParaRPr lang="en-US" dirty="0"/>
           </a:p>
           <a:p>
             <a:pPr marL="342900" indent="-342900">
@@ -7830,21 +9318,21 @@
               <a:buAutoNum type="arabicParenBoth"/>
             </a:pPr>
             <a:r>
-              <a:rPr lang="en-US"/>
-              <a:t>n_estimators = 100, max_depth = 10, criterion = entropy</a:t>
-            </a:r>
-          </a:p>
-          <a:p>
-            <a:pPr marL="342900" indent="-342900">
-              <a:buAutoNum type="arabicParenBoth"/>
-            </a:pPr>
-            <a:endParaRPr lang="en-US"/>
-          </a:p>
-          <a:p>
-            <a:pPr marL="342900" indent="-342900">
-              <a:buAutoNum type="arabicParenBoth"/>
-            </a:pPr>
-            <a:endParaRPr lang="en-US"/>
+              <a:rPr lang="en-US" dirty="0" err="1"/>
+              <a:t>n_estimators</a:t>
+            </a:r>
+            <a:r>
+              <a:rPr lang="en-US" dirty="0"/>
+              <a:t> = 100, </a:t>
+            </a:r>
+            <a:r>
+              <a:rPr lang="en-US" dirty="0" err="1"/>
+              <a:t>max_depth</a:t>
+            </a:r>
+            <a:r>
+              <a:rPr lang="en-US" dirty="0"/>
+              <a:t> = 10, criterion = entropy</a:t>
+            </a:r>
           </a:p>
         </p:txBody>
       </p:sp>
@@ -7883,7 +9371,7 @@
           <p:cNvPr id="2" name="Title 1">
             <a:extLst>
               <a:ext uri="{FF2B5EF4-FFF2-40B4-BE49-F238E27FC236}">
-                <a16:creationId xmlns:a16="http://schemas.microsoft.com/office/drawing/2014/main" id="{20F3B432-91FC-0042-80AA-F8DA114FD276}"/>
+                <a16:creationId xmlns:a16="http://schemas.microsoft.com/office/drawing/2014/main" id="{4AACECB1-D033-4E4B-9751-7F74CDB85CE2}"/>
               </a:ext>
             </a:extLst>
           </p:cNvPr>
@@ -7896,8 +9384,8 @@
         </p:nvSpPr>
         <p:spPr>
           <a:xfrm>
-            <a:off x="2231136" y="501705"/>
-            <a:ext cx="7729728" cy="875682"/>
+            <a:off x="2286000" y="914400"/>
+            <a:ext cx="7772400" cy="914400"/>
           </a:xfrm>
         </p:spPr>
         <p:txBody>
@@ -7905,146 +9393,76 @@
           <a:lstStyle/>
           <a:p>
             <a:r>
-              <a:rPr lang="en-US"/>
-              <a:t>Final Model evaluation</a:t>
+              <a:rPr lang="en-US" dirty="0"/>
+              <a:t>Model tuning</a:t>
             </a:r>
           </a:p>
         </p:txBody>
       </p:sp>
       <p:pic>
         <p:nvPicPr>
-          <p:cNvPr id="4" name="Picture 3">
+          <p:cNvPr id="2050" name="Picture 2">
             <a:extLst>
               <a:ext uri="{FF2B5EF4-FFF2-40B4-BE49-F238E27FC236}">
-                <a16:creationId xmlns:a16="http://schemas.microsoft.com/office/drawing/2014/main" id="{4AD2803C-3889-984E-A36E-24A43FAFAC5A}"/>
+                <a16:creationId xmlns:a16="http://schemas.microsoft.com/office/drawing/2014/main" id="{31AAF0CE-4883-4015-9C37-D59A97FFCEC5}"/>
               </a:ext>
             </a:extLst>
           </p:cNvPr>
           <p:cNvPicPr>
-            <a:picLocks noChangeAspect="1"/>
+            <a:picLocks noChangeAspect="1" noChangeArrowheads="1"/>
           </p:cNvPicPr>
           <p:nvPr/>
         </p:nvPicPr>
         <p:blipFill>
-          <a:blip r:embed="rId2"/>
+          <a:blip r:embed="rId2">
+            <a:extLst>
+              <a:ext uri="{28A0092B-C50C-407E-A947-70E740481C1C}">
+                <a14:useLocalDpi xmlns:a14="http://schemas.microsoft.com/office/drawing/2010/main" val="0"/>
+              </a:ext>
+            </a:extLst>
+          </a:blip>
+          <a:srcRect/>
           <a:stretch>
             <a:fillRect/>
           </a:stretch>
         </p:blipFill>
-        <p:spPr>
+        <p:spPr bwMode="auto">
           <a:xfrm>
-            <a:off x="949203" y="2329005"/>
-            <a:ext cx="4912893" cy="3643533"/>
-          </a:xfrm>
-          <a:prstGeom prst="rect">
-            <a:avLst/>
-          </a:prstGeom>
-        </p:spPr>
-      </p:pic>
-      <p:pic>
-        <p:nvPicPr>
-          <p:cNvPr id="5" name="Picture 4">
-            <a:extLst>
-              <a:ext uri="{FF2B5EF4-FFF2-40B4-BE49-F238E27FC236}">
-                <a16:creationId xmlns:a16="http://schemas.microsoft.com/office/drawing/2014/main" id="{2B58AB24-F64E-B94C-8013-848E657FECB2}"/>
-              </a:ext>
-            </a:extLst>
-          </p:cNvPr>
-          <p:cNvPicPr>
-            <a:picLocks noChangeAspect="1"/>
-          </p:cNvPicPr>
-          <p:nvPr/>
-        </p:nvPicPr>
-        <p:blipFill>
-          <a:blip r:embed="rId3"/>
-          <a:stretch>
-            <a:fillRect/>
-          </a:stretch>
-        </p:blipFill>
-        <p:spPr>
-          <a:xfrm>
-            <a:off x="6096000" y="2329004"/>
-            <a:ext cx="4998750" cy="3643533"/>
-          </a:xfrm>
-          <a:prstGeom prst="rect">
-            <a:avLst/>
-          </a:prstGeom>
-        </p:spPr>
-      </p:pic>
-      <p:sp>
-        <p:nvSpPr>
-          <p:cNvPr id="6" name="TextBox 5">
-            <a:extLst>
-              <a:ext uri="{FF2B5EF4-FFF2-40B4-BE49-F238E27FC236}">
-                <a16:creationId xmlns:a16="http://schemas.microsoft.com/office/drawing/2014/main" id="{33004B51-27C5-224A-A85C-1F2D5987C8DC}"/>
-              </a:ext>
-            </a:extLst>
-          </p:cNvPr>
-          <p:cNvSpPr txBox="1"/>
-          <p:nvPr/>
-        </p:nvSpPr>
-        <p:spPr>
-          <a:xfrm>
-            <a:off x="2106592" y="1770927"/>
-            <a:ext cx="2620461" cy="369332"/>
+            <a:off x="3512051" y="2616708"/>
+            <a:ext cx="4924425" cy="3276600"/>
           </a:xfrm>
           <a:prstGeom prst="rect">
             <a:avLst/>
           </a:prstGeom>
           <a:noFill/>
+          <a:ln>
+            <a:noFill/>
+          </a:ln>
+          <a:extLst>
+            <a:ext uri="{909E8E84-426E-40DD-AFC4-6F175D3DCCD1}">
+              <a14:hiddenFill xmlns:a14="http://schemas.microsoft.com/office/drawing/2010/main">
+                <a:solidFill>
+                  <a:srgbClr val="FFFFFF"/>
+                </a:solidFill>
+              </a14:hiddenFill>
+            </a:ext>
+            <a:ext uri="{91240B29-F687-4F45-9708-019B960494DF}">
+              <a14:hiddenLine xmlns:a14="http://schemas.microsoft.com/office/drawing/2010/main" w="9525">
+                <a:solidFill>
+                  <a:srgbClr val="000000"/>
+                </a:solidFill>
+                <a:miter lim="800000"/>
+                <a:headEnd/>
+                <a:tailEnd/>
+              </a14:hiddenLine>
+            </a:ext>
+          </a:extLst>
         </p:spPr>
-        <p:txBody>
-          <a:bodyPr wrap="none" rtlCol="0">
-            <a:spAutoFit/>
-          </a:bodyPr>
-          <a:lstStyle/>
-          <a:p>
-            <a:r>
-              <a:rPr lang="en-US" b="1"/>
-              <a:t>Precision-Recall Curve</a:t>
-            </a:r>
-          </a:p>
-        </p:txBody>
-      </p:sp>
-      <p:sp>
-        <p:nvSpPr>
-          <p:cNvPr id="7" name="TextBox 6">
-            <a:extLst>
-              <a:ext uri="{FF2B5EF4-FFF2-40B4-BE49-F238E27FC236}">
-                <a16:creationId xmlns:a16="http://schemas.microsoft.com/office/drawing/2014/main" id="{419ECF04-9BCA-D04B-8C2A-32C4A2864F4E}"/>
-              </a:ext>
-            </a:extLst>
-          </p:cNvPr>
-          <p:cNvSpPr txBox="1"/>
-          <p:nvPr/>
-        </p:nvSpPr>
-        <p:spPr>
-          <a:xfrm>
-            <a:off x="7162450" y="1770927"/>
-            <a:ext cx="2865849" cy="369332"/>
-          </a:xfrm>
-          <a:prstGeom prst="rect">
-            <a:avLst/>
-          </a:prstGeom>
-          <a:noFill/>
-        </p:spPr>
-        <p:txBody>
-          <a:bodyPr wrap="none" rtlCol="0">
-            <a:spAutoFit/>
-          </a:bodyPr>
-          <a:lstStyle/>
-          <a:p>
-            <a:r>
-              <a:rPr lang="en-US" b="1"/>
-              <a:t>Cost Function (example)</a:t>
-            </a:r>
-          </a:p>
-        </p:txBody>
-      </p:sp>
+      </p:pic>
     </p:spTree>
     <p:extLst>
       <p:ext uri="{BB962C8B-B14F-4D97-AF65-F5344CB8AC3E}">
-        <p14:creationId xmlns:p14="http://schemas.microsoft.com/office/powerpoint/2010/main" val="3742588891"/>
+        <p14:creationId xmlns:p14="http://schemas.microsoft.com/office/powerpoint/2010/main" val="237996111"/>
       </p:ext>
     </p:extLst>
   </p:cSld>

</xml_diff>